<commit_message>
logic class diagram update
</commit_message>
<xml_diff>
--- a/docs/diagrams/LogicClassDiagram.pptx
+++ b/docs/diagrams/LogicClassDiagram.pptx
@@ -196,35 +196,35 @@
               <a:buNone/>
               <a:defRPr sz="2400"/>
             </a:lvl1pPr>
-            <a:lvl2pPr marL="457200" indent="0" algn="ctr">
+            <a:lvl2pPr marL="457159" indent="0" algn="ctr">
               <a:buNone/>
               <a:defRPr sz="2000"/>
             </a:lvl2pPr>
-            <a:lvl3pPr marL="914400" indent="0" algn="ctr">
+            <a:lvl3pPr marL="914317" indent="0" algn="ctr">
               <a:buNone/>
               <a:defRPr sz="1800"/>
             </a:lvl3pPr>
-            <a:lvl4pPr marL="1371600" indent="0" algn="ctr">
+            <a:lvl4pPr marL="1371476" indent="0" algn="ctr">
               <a:buNone/>
               <a:defRPr sz="1600"/>
             </a:lvl4pPr>
-            <a:lvl5pPr marL="1828800" indent="0" algn="ctr">
+            <a:lvl5pPr marL="1828634" indent="0" algn="ctr">
               <a:buNone/>
               <a:defRPr sz="1600"/>
             </a:lvl5pPr>
-            <a:lvl6pPr marL="2286000" indent="0" algn="ctr">
+            <a:lvl6pPr marL="2285793" indent="0" algn="ctr">
               <a:buNone/>
               <a:defRPr sz="1600"/>
             </a:lvl6pPr>
-            <a:lvl7pPr marL="2743200" indent="0" algn="ctr">
+            <a:lvl7pPr marL="2742951" indent="0" algn="ctr">
               <a:buNone/>
               <a:defRPr sz="1600"/>
             </a:lvl7pPr>
-            <a:lvl8pPr marL="3200400" indent="0" algn="ctr">
+            <a:lvl8pPr marL="3200110" indent="0" algn="ctr">
               <a:buNone/>
               <a:defRPr sz="1600"/>
             </a:lvl8pPr>
-            <a:lvl9pPr marL="3657600" indent="0" algn="ctr">
+            <a:lvl9pPr marL="3657269" indent="0" algn="ctr">
               <a:buNone/>
               <a:defRPr sz="1600"/>
             </a:lvl9pPr>
@@ -261,7 +261,7 @@
           <a:p>
             <a:fld id="{2234AB4E-EA5F-4C87-94B4-611343EDF8A2}" type="datetimeFigureOut">
               <a:rPr lang="zh-CN" altLang="en-US" smtClean="0"/>
-              <a:t>2019/11/3</a:t>
+              <a:t>2019/11/11</a:t>
             </a:fld>
             <a:endParaRPr lang="zh-CN" altLang="en-US"/>
           </a:p>
@@ -461,7 +461,7 @@
           <a:p>
             <a:fld id="{2234AB4E-EA5F-4C87-94B4-611343EDF8A2}" type="datetimeFigureOut">
               <a:rPr lang="zh-CN" altLang="en-US" smtClean="0"/>
-              <a:t>2019/11/3</a:t>
+              <a:t>2019/11/11</a:t>
             </a:fld>
             <a:endParaRPr lang="zh-CN" altLang="en-US"/>
           </a:p>
@@ -603,7 +603,7 @@
         </p:nvSpPr>
         <p:spPr>
           <a:xfrm>
-            <a:off x="838200" y="365125"/>
+            <a:off x="838201" y="365125"/>
             <a:ext cx="7734300" cy="5811838"/>
           </a:xfrm>
         </p:spPr>
@@ -671,7 +671,7 @@
           <a:p>
             <a:fld id="{2234AB4E-EA5F-4C87-94B4-611343EDF8A2}" type="datetimeFigureOut">
               <a:rPr lang="zh-CN" altLang="en-US" smtClean="0"/>
-              <a:t>2019/11/3</a:t>
+              <a:t>2019/11/11</a:t>
             </a:fld>
             <a:endParaRPr lang="zh-CN" altLang="en-US"/>
           </a:p>
@@ -871,7 +871,7 @@
           <a:p>
             <a:fld id="{2234AB4E-EA5F-4C87-94B4-611343EDF8A2}" type="datetimeFigureOut">
               <a:rPr lang="zh-CN" altLang="en-US" smtClean="0"/>
-              <a:t>2019/11/3</a:t>
+              <a:t>2019/11/11</a:t>
             </a:fld>
             <a:endParaRPr lang="zh-CN" altLang="en-US"/>
           </a:p>
@@ -979,7 +979,7 @@
         </p:nvSpPr>
         <p:spPr>
           <a:xfrm>
-            <a:off x="831850" y="1709738"/>
+            <a:off x="831851" y="1709742"/>
             <a:ext cx="10515600" cy="2852737"/>
           </a:xfrm>
         </p:spPr>
@@ -1017,7 +1017,7 @@
         </p:nvSpPr>
         <p:spPr>
           <a:xfrm>
-            <a:off x="831850" y="4589463"/>
+            <a:off x="831851" y="4589467"/>
             <a:ext cx="10515600" cy="1500187"/>
           </a:xfrm>
         </p:spPr>
@@ -1034,7 +1034,7 @@
                 </a:solidFill>
               </a:defRPr>
             </a:lvl1pPr>
-            <a:lvl2pPr marL="457200" indent="0">
+            <a:lvl2pPr marL="457159" indent="0">
               <a:buNone/>
               <a:defRPr sz="2000">
                 <a:solidFill>
@@ -1044,7 +1044,7 @@
                 </a:solidFill>
               </a:defRPr>
             </a:lvl2pPr>
-            <a:lvl3pPr marL="914400" indent="0">
+            <a:lvl3pPr marL="914317" indent="0">
               <a:buNone/>
               <a:defRPr sz="1800">
                 <a:solidFill>
@@ -1054,7 +1054,7 @@
                 </a:solidFill>
               </a:defRPr>
             </a:lvl3pPr>
-            <a:lvl4pPr marL="1371600" indent="0">
+            <a:lvl4pPr marL="1371476" indent="0">
               <a:buNone/>
               <a:defRPr sz="1600">
                 <a:solidFill>
@@ -1064,7 +1064,7 @@
                 </a:solidFill>
               </a:defRPr>
             </a:lvl4pPr>
-            <a:lvl5pPr marL="1828800" indent="0">
+            <a:lvl5pPr marL="1828634" indent="0">
               <a:buNone/>
               <a:defRPr sz="1600">
                 <a:solidFill>
@@ -1074,7 +1074,7 @@
                 </a:solidFill>
               </a:defRPr>
             </a:lvl5pPr>
-            <a:lvl6pPr marL="2286000" indent="0">
+            <a:lvl6pPr marL="2285793" indent="0">
               <a:buNone/>
               <a:defRPr sz="1600">
                 <a:solidFill>
@@ -1084,7 +1084,7 @@
                 </a:solidFill>
               </a:defRPr>
             </a:lvl6pPr>
-            <a:lvl7pPr marL="2743200" indent="0">
+            <a:lvl7pPr marL="2742951" indent="0">
               <a:buNone/>
               <a:defRPr sz="1600">
                 <a:solidFill>
@@ -1094,7 +1094,7 @@
                 </a:solidFill>
               </a:defRPr>
             </a:lvl7pPr>
-            <a:lvl8pPr marL="3200400" indent="0">
+            <a:lvl8pPr marL="3200110" indent="0">
               <a:buNone/>
               <a:defRPr sz="1600">
                 <a:solidFill>
@@ -1104,7 +1104,7 @@
                 </a:solidFill>
               </a:defRPr>
             </a:lvl8pPr>
-            <a:lvl9pPr marL="3657600" indent="0">
+            <a:lvl9pPr marL="3657269" indent="0">
               <a:buNone/>
               <a:defRPr sz="1600">
                 <a:solidFill>
@@ -1147,7 +1147,7 @@
           <a:p>
             <a:fld id="{2234AB4E-EA5F-4C87-94B4-611343EDF8A2}" type="datetimeFigureOut">
               <a:rPr lang="zh-CN" altLang="en-US" smtClean="0"/>
-              <a:t>2019/11/3</a:t>
+              <a:t>2019/11/11</a:t>
             </a:fld>
             <a:endParaRPr lang="zh-CN" altLang="en-US"/>
           </a:p>
@@ -1347,7 +1347,7 @@
         </p:nvSpPr>
         <p:spPr>
           <a:xfrm>
-            <a:off x="6172200" y="1825625"/>
+            <a:off x="6172202" y="1825625"/>
             <a:ext cx="5181600" cy="4351338"/>
           </a:xfrm>
         </p:spPr>
@@ -1415,7 +1415,7 @@
           <a:p>
             <a:fld id="{2234AB4E-EA5F-4C87-94B4-611343EDF8A2}" type="datetimeFigureOut">
               <a:rPr lang="zh-CN" altLang="en-US" smtClean="0"/>
-              <a:t>2019/11/3</a:t>
+              <a:t>2019/11/11</a:t>
             </a:fld>
             <a:endParaRPr lang="zh-CN" altLang="en-US"/>
           </a:p>
@@ -1523,7 +1523,7 @@
         </p:nvSpPr>
         <p:spPr>
           <a:xfrm>
-            <a:off x="839788" y="365125"/>
+            <a:off x="839788" y="365129"/>
             <a:ext cx="10515600" cy="1325563"/>
           </a:xfrm>
         </p:spPr>
@@ -1557,7 +1557,7 @@
         </p:nvSpPr>
         <p:spPr>
           <a:xfrm>
-            <a:off x="839788" y="1681163"/>
+            <a:off x="839790" y="1681163"/>
             <a:ext cx="5157787" cy="823912"/>
           </a:xfrm>
         </p:spPr>
@@ -1568,35 +1568,35 @@
               <a:buNone/>
               <a:defRPr sz="2400" b="1"/>
             </a:lvl1pPr>
-            <a:lvl2pPr marL="457200" indent="0">
+            <a:lvl2pPr marL="457159" indent="0">
               <a:buNone/>
               <a:defRPr sz="2000" b="1"/>
             </a:lvl2pPr>
-            <a:lvl3pPr marL="914400" indent="0">
+            <a:lvl3pPr marL="914317" indent="0">
               <a:buNone/>
               <a:defRPr sz="1800" b="1"/>
             </a:lvl3pPr>
-            <a:lvl4pPr marL="1371600" indent="0">
+            <a:lvl4pPr marL="1371476" indent="0">
               <a:buNone/>
               <a:defRPr sz="1600" b="1"/>
             </a:lvl4pPr>
-            <a:lvl5pPr marL="1828800" indent="0">
+            <a:lvl5pPr marL="1828634" indent="0">
               <a:buNone/>
               <a:defRPr sz="1600" b="1"/>
             </a:lvl5pPr>
-            <a:lvl6pPr marL="2286000" indent="0">
+            <a:lvl6pPr marL="2285793" indent="0">
               <a:buNone/>
               <a:defRPr sz="1600" b="1"/>
             </a:lvl6pPr>
-            <a:lvl7pPr marL="2743200" indent="0">
+            <a:lvl7pPr marL="2742951" indent="0">
               <a:buNone/>
               <a:defRPr sz="1600" b="1"/>
             </a:lvl7pPr>
-            <a:lvl8pPr marL="3200400" indent="0">
+            <a:lvl8pPr marL="3200110" indent="0">
               <a:buNone/>
               <a:defRPr sz="1600" b="1"/>
             </a:lvl8pPr>
-            <a:lvl9pPr marL="3657600" indent="0">
+            <a:lvl9pPr marL="3657269" indent="0">
               <a:buNone/>
               <a:defRPr sz="1600" b="1"/>
             </a:lvl9pPr>
@@ -1628,7 +1628,7 @@
         </p:nvSpPr>
         <p:spPr>
           <a:xfrm>
-            <a:off x="839788" y="2505075"/>
+            <a:off x="839790" y="2505075"/>
             <a:ext cx="5157787" cy="3684588"/>
           </a:xfrm>
         </p:spPr>
@@ -1691,7 +1691,7 @@
         </p:nvSpPr>
         <p:spPr>
           <a:xfrm>
-            <a:off x="6172200" y="1681163"/>
+            <a:off x="6172201" y="1681163"/>
             <a:ext cx="5183188" cy="823912"/>
           </a:xfrm>
         </p:spPr>
@@ -1702,35 +1702,35 @@
               <a:buNone/>
               <a:defRPr sz="2400" b="1"/>
             </a:lvl1pPr>
-            <a:lvl2pPr marL="457200" indent="0">
+            <a:lvl2pPr marL="457159" indent="0">
               <a:buNone/>
               <a:defRPr sz="2000" b="1"/>
             </a:lvl2pPr>
-            <a:lvl3pPr marL="914400" indent="0">
+            <a:lvl3pPr marL="914317" indent="0">
               <a:buNone/>
               <a:defRPr sz="1800" b="1"/>
             </a:lvl3pPr>
-            <a:lvl4pPr marL="1371600" indent="0">
+            <a:lvl4pPr marL="1371476" indent="0">
               <a:buNone/>
               <a:defRPr sz="1600" b="1"/>
             </a:lvl4pPr>
-            <a:lvl5pPr marL="1828800" indent="0">
+            <a:lvl5pPr marL="1828634" indent="0">
               <a:buNone/>
               <a:defRPr sz="1600" b="1"/>
             </a:lvl5pPr>
-            <a:lvl6pPr marL="2286000" indent="0">
+            <a:lvl6pPr marL="2285793" indent="0">
               <a:buNone/>
               <a:defRPr sz="1600" b="1"/>
             </a:lvl6pPr>
-            <a:lvl7pPr marL="2743200" indent="0">
+            <a:lvl7pPr marL="2742951" indent="0">
               <a:buNone/>
               <a:defRPr sz="1600" b="1"/>
             </a:lvl7pPr>
-            <a:lvl8pPr marL="3200400" indent="0">
+            <a:lvl8pPr marL="3200110" indent="0">
               <a:buNone/>
               <a:defRPr sz="1600" b="1"/>
             </a:lvl8pPr>
-            <a:lvl9pPr marL="3657600" indent="0">
+            <a:lvl9pPr marL="3657269" indent="0">
               <a:buNone/>
               <a:defRPr sz="1600" b="1"/>
             </a:lvl9pPr>
@@ -1762,7 +1762,7 @@
         </p:nvSpPr>
         <p:spPr>
           <a:xfrm>
-            <a:off x="6172200" y="2505075"/>
+            <a:off x="6172201" y="2505075"/>
             <a:ext cx="5183188" cy="3684588"/>
           </a:xfrm>
         </p:spPr>
@@ -1830,7 +1830,7 @@
           <a:p>
             <a:fld id="{2234AB4E-EA5F-4C87-94B4-611343EDF8A2}" type="datetimeFigureOut">
               <a:rPr lang="zh-CN" altLang="en-US" smtClean="0"/>
-              <a:t>2019/11/3</a:t>
+              <a:t>2019/11/11</a:t>
             </a:fld>
             <a:endParaRPr lang="zh-CN" altLang="en-US"/>
           </a:p>
@@ -1972,7 +1972,7 @@
           <a:p>
             <a:fld id="{2234AB4E-EA5F-4C87-94B4-611343EDF8A2}" type="datetimeFigureOut">
               <a:rPr lang="zh-CN" altLang="en-US" smtClean="0"/>
-              <a:t>2019/11/3</a:t>
+              <a:t>2019/11/11</a:t>
             </a:fld>
             <a:endParaRPr lang="zh-CN" altLang="en-US"/>
           </a:p>
@@ -2085,7 +2085,7 @@
           <a:p>
             <a:fld id="{2234AB4E-EA5F-4C87-94B4-611343EDF8A2}" type="datetimeFigureOut">
               <a:rPr lang="zh-CN" altLang="en-US" smtClean="0"/>
-              <a:t>2019/11/3</a:t>
+              <a:t>2019/11/11</a:t>
             </a:fld>
             <a:endParaRPr lang="zh-CN" altLang="en-US"/>
           </a:p>
@@ -2193,7 +2193,7 @@
         </p:nvSpPr>
         <p:spPr>
           <a:xfrm>
-            <a:off x="839788" y="457200"/>
+            <a:off x="839790" y="457200"/>
             <a:ext cx="3932237" cy="1600200"/>
           </a:xfrm>
         </p:spPr>
@@ -2231,7 +2231,7 @@
         </p:nvSpPr>
         <p:spPr>
           <a:xfrm>
-            <a:off x="5183188" y="987425"/>
+            <a:off x="5183188" y="987429"/>
             <a:ext cx="6172200" cy="4873625"/>
           </a:xfrm>
         </p:spPr>
@@ -2242,7 +2242,7 @@
               <a:defRPr sz="3200"/>
             </a:lvl1pPr>
             <a:lvl2pPr>
-              <a:defRPr sz="2800"/>
+              <a:defRPr sz="2799"/>
             </a:lvl2pPr>
             <a:lvl3pPr>
               <a:defRPr sz="2400"/>
@@ -2322,7 +2322,7 @@
         </p:nvSpPr>
         <p:spPr>
           <a:xfrm>
-            <a:off x="839788" y="2057400"/>
+            <a:off x="839790" y="2057400"/>
             <a:ext cx="3932237" cy="3811588"/>
           </a:xfrm>
         </p:spPr>
@@ -2333,35 +2333,35 @@
               <a:buNone/>
               <a:defRPr sz="1600"/>
             </a:lvl1pPr>
-            <a:lvl2pPr marL="457200" indent="0">
+            <a:lvl2pPr marL="457159" indent="0">
               <a:buNone/>
               <a:defRPr sz="1400"/>
             </a:lvl2pPr>
-            <a:lvl3pPr marL="914400" indent="0">
+            <a:lvl3pPr marL="914317" indent="0">
               <a:buNone/>
               <a:defRPr sz="1200"/>
             </a:lvl3pPr>
-            <a:lvl4pPr marL="1371600" indent="0">
+            <a:lvl4pPr marL="1371476" indent="0">
               <a:buNone/>
               <a:defRPr sz="1000"/>
             </a:lvl4pPr>
-            <a:lvl5pPr marL="1828800" indent="0">
+            <a:lvl5pPr marL="1828634" indent="0">
               <a:buNone/>
               <a:defRPr sz="1000"/>
             </a:lvl5pPr>
-            <a:lvl6pPr marL="2286000" indent="0">
+            <a:lvl6pPr marL="2285793" indent="0">
               <a:buNone/>
               <a:defRPr sz="1000"/>
             </a:lvl6pPr>
-            <a:lvl7pPr marL="2743200" indent="0">
+            <a:lvl7pPr marL="2742951" indent="0">
               <a:buNone/>
               <a:defRPr sz="1000"/>
             </a:lvl7pPr>
-            <a:lvl8pPr marL="3200400" indent="0">
+            <a:lvl8pPr marL="3200110" indent="0">
               <a:buNone/>
               <a:defRPr sz="1000"/>
             </a:lvl8pPr>
-            <a:lvl9pPr marL="3657600" indent="0">
+            <a:lvl9pPr marL="3657269" indent="0">
               <a:buNone/>
               <a:defRPr sz="1000"/>
             </a:lvl9pPr>
@@ -2398,7 +2398,7 @@
           <a:p>
             <a:fld id="{2234AB4E-EA5F-4C87-94B4-611343EDF8A2}" type="datetimeFigureOut">
               <a:rPr lang="zh-CN" altLang="en-US" smtClean="0"/>
-              <a:t>2019/11/3</a:t>
+              <a:t>2019/11/11</a:t>
             </a:fld>
             <a:endParaRPr lang="zh-CN" altLang="en-US"/>
           </a:p>
@@ -2506,7 +2506,7 @@
         </p:nvSpPr>
         <p:spPr>
           <a:xfrm>
-            <a:off x="839788" y="457200"/>
+            <a:off x="839790" y="457200"/>
             <a:ext cx="3932237" cy="1600200"/>
           </a:xfrm>
         </p:spPr>
@@ -2544,7 +2544,7 @@
         </p:nvSpPr>
         <p:spPr>
           <a:xfrm>
-            <a:off x="5183188" y="987425"/>
+            <a:off x="5183188" y="987429"/>
             <a:ext cx="6172200" cy="4873625"/>
           </a:xfrm>
         </p:spPr>
@@ -2555,35 +2555,35 @@
               <a:buNone/>
               <a:defRPr sz="3200"/>
             </a:lvl1pPr>
-            <a:lvl2pPr marL="457200" indent="0">
-              <a:buNone/>
-              <a:defRPr sz="2800"/>
+            <a:lvl2pPr marL="457159" indent="0">
+              <a:buNone/>
+              <a:defRPr sz="2799"/>
             </a:lvl2pPr>
-            <a:lvl3pPr marL="914400" indent="0">
+            <a:lvl3pPr marL="914317" indent="0">
               <a:buNone/>
               <a:defRPr sz="2400"/>
             </a:lvl3pPr>
-            <a:lvl4pPr marL="1371600" indent="0">
+            <a:lvl4pPr marL="1371476" indent="0">
               <a:buNone/>
               <a:defRPr sz="2000"/>
             </a:lvl4pPr>
-            <a:lvl5pPr marL="1828800" indent="0">
+            <a:lvl5pPr marL="1828634" indent="0">
               <a:buNone/>
               <a:defRPr sz="2000"/>
             </a:lvl5pPr>
-            <a:lvl6pPr marL="2286000" indent="0">
+            <a:lvl6pPr marL="2285793" indent="0">
               <a:buNone/>
               <a:defRPr sz="2000"/>
             </a:lvl6pPr>
-            <a:lvl7pPr marL="2743200" indent="0">
+            <a:lvl7pPr marL="2742951" indent="0">
               <a:buNone/>
               <a:defRPr sz="2000"/>
             </a:lvl7pPr>
-            <a:lvl8pPr marL="3200400" indent="0">
+            <a:lvl8pPr marL="3200110" indent="0">
               <a:buNone/>
               <a:defRPr sz="2000"/>
             </a:lvl8pPr>
-            <a:lvl9pPr marL="3657600" indent="0">
+            <a:lvl9pPr marL="3657269" indent="0">
               <a:buNone/>
               <a:defRPr sz="2000"/>
             </a:lvl9pPr>
@@ -2611,7 +2611,7 @@
         </p:nvSpPr>
         <p:spPr>
           <a:xfrm>
-            <a:off x="839788" y="2057400"/>
+            <a:off x="839790" y="2057400"/>
             <a:ext cx="3932237" cy="3811588"/>
           </a:xfrm>
         </p:spPr>
@@ -2622,35 +2622,35 @@
               <a:buNone/>
               <a:defRPr sz="1600"/>
             </a:lvl1pPr>
-            <a:lvl2pPr marL="457200" indent="0">
+            <a:lvl2pPr marL="457159" indent="0">
               <a:buNone/>
               <a:defRPr sz="1400"/>
             </a:lvl2pPr>
-            <a:lvl3pPr marL="914400" indent="0">
+            <a:lvl3pPr marL="914317" indent="0">
               <a:buNone/>
               <a:defRPr sz="1200"/>
             </a:lvl3pPr>
-            <a:lvl4pPr marL="1371600" indent="0">
+            <a:lvl4pPr marL="1371476" indent="0">
               <a:buNone/>
               <a:defRPr sz="1000"/>
             </a:lvl4pPr>
-            <a:lvl5pPr marL="1828800" indent="0">
+            <a:lvl5pPr marL="1828634" indent="0">
               <a:buNone/>
               <a:defRPr sz="1000"/>
             </a:lvl5pPr>
-            <a:lvl6pPr marL="2286000" indent="0">
+            <a:lvl6pPr marL="2285793" indent="0">
               <a:buNone/>
               <a:defRPr sz="1000"/>
             </a:lvl6pPr>
-            <a:lvl7pPr marL="2743200" indent="0">
+            <a:lvl7pPr marL="2742951" indent="0">
               <a:buNone/>
               <a:defRPr sz="1000"/>
             </a:lvl7pPr>
-            <a:lvl8pPr marL="3200400" indent="0">
+            <a:lvl8pPr marL="3200110" indent="0">
               <a:buNone/>
               <a:defRPr sz="1000"/>
             </a:lvl8pPr>
-            <a:lvl9pPr marL="3657600" indent="0">
+            <a:lvl9pPr marL="3657269" indent="0">
               <a:buNone/>
               <a:defRPr sz="1000"/>
             </a:lvl9pPr>
@@ -2687,7 +2687,7 @@
           <a:p>
             <a:fld id="{2234AB4E-EA5F-4C87-94B4-611343EDF8A2}" type="datetimeFigureOut">
               <a:rPr lang="zh-CN" altLang="en-US" smtClean="0"/>
-              <a:t>2019/11/3</a:t>
+              <a:t>2019/11/11</a:t>
             </a:fld>
             <a:endParaRPr lang="zh-CN" altLang="en-US"/>
           </a:p>
@@ -2800,7 +2800,7 @@
         </p:nvSpPr>
         <p:spPr>
           <a:xfrm>
-            <a:off x="838200" y="365125"/>
+            <a:off x="838200" y="365129"/>
             <a:ext cx="10515600" cy="1325563"/>
           </a:xfrm>
           <a:prstGeom prst="rect">
@@ -2907,7 +2907,7 @@
         </p:nvSpPr>
         <p:spPr>
           <a:xfrm>
-            <a:off x="838200" y="6356350"/>
+            <a:off x="838200" y="6356354"/>
             <a:ext cx="2743200" cy="365125"/>
           </a:xfrm>
           <a:prstGeom prst="rect">
@@ -2930,7 +2930,7 @@
           <a:p>
             <a:fld id="{2234AB4E-EA5F-4C87-94B4-611343EDF8A2}" type="datetimeFigureOut">
               <a:rPr lang="zh-CN" altLang="en-US" smtClean="0"/>
-              <a:t>2019/11/3</a:t>
+              <a:t>2019/11/11</a:t>
             </a:fld>
             <a:endParaRPr lang="zh-CN" altLang="en-US"/>
           </a:p>
@@ -2954,7 +2954,7 @@
         </p:nvSpPr>
         <p:spPr>
           <a:xfrm>
-            <a:off x="4038600" y="6356350"/>
+            <a:off x="4038600" y="6356354"/>
             <a:ext cx="4114800" cy="365125"/>
           </a:xfrm>
           <a:prstGeom prst="rect">
@@ -2997,7 +2997,7 @@
         </p:nvSpPr>
         <p:spPr>
           <a:xfrm>
-            <a:off x="8610600" y="6356350"/>
+            <a:off x="8610600" y="6356354"/>
             <a:ext cx="2743200" cy="365125"/>
           </a:xfrm>
           <a:prstGeom prst="rect">
@@ -3049,7 +3049,7 @@
   </p:sldLayoutIdLst>
   <p:txStyles>
     <p:titleStyle>
-      <a:lvl1pPr algn="l" defTabSz="914400" rtl="0" eaLnBrk="1" latinLnBrk="0" hangingPunct="1">
+      <a:lvl1pPr algn="l" defTabSz="914317" rtl="0" eaLnBrk="1" latinLnBrk="0" hangingPunct="1">
         <a:lnSpc>
           <a:spcPct val="90000"/>
         </a:lnSpc>
@@ -3068,7 +3068,7 @@
       </a:lvl1pPr>
     </p:titleStyle>
     <p:bodyStyle>
-      <a:lvl1pPr marL="228600" indent="-228600" algn="l" defTabSz="914400" rtl="0" eaLnBrk="1" latinLnBrk="0" hangingPunct="1">
+      <a:lvl1pPr marL="228579" indent="-228579" algn="l" defTabSz="914317" rtl="0" eaLnBrk="1" latinLnBrk="0" hangingPunct="1">
         <a:lnSpc>
           <a:spcPct val="90000"/>
         </a:lnSpc>
@@ -3077,7 +3077,7 @@
         </a:spcBef>
         <a:buFont typeface="Arial" panose="020B0604020202020204" pitchFamily="34" charset="0"/>
         <a:buChar char="•"/>
-        <a:defRPr sz="2800" kern="1200">
+        <a:defRPr sz="2799" kern="1200">
           <a:solidFill>
             <a:schemeClr val="tx1"/>
           </a:solidFill>
@@ -3086,7 +3086,7 @@
           <a:cs typeface="+mn-cs"/>
         </a:defRPr>
       </a:lvl1pPr>
-      <a:lvl2pPr marL="685800" indent="-228600" algn="l" defTabSz="914400" rtl="0" eaLnBrk="1" latinLnBrk="0" hangingPunct="1">
+      <a:lvl2pPr marL="685738" indent="-228579" algn="l" defTabSz="914317" rtl="0" eaLnBrk="1" latinLnBrk="0" hangingPunct="1">
         <a:lnSpc>
           <a:spcPct val="90000"/>
         </a:lnSpc>
@@ -3104,7 +3104,7 @@
           <a:cs typeface="+mn-cs"/>
         </a:defRPr>
       </a:lvl2pPr>
-      <a:lvl3pPr marL="1143000" indent="-228600" algn="l" defTabSz="914400" rtl="0" eaLnBrk="1" latinLnBrk="0" hangingPunct="1">
+      <a:lvl3pPr marL="1142897" indent="-228579" algn="l" defTabSz="914317" rtl="0" eaLnBrk="1" latinLnBrk="0" hangingPunct="1">
         <a:lnSpc>
           <a:spcPct val="90000"/>
         </a:lnSpc>
@@ -3122,7 +3122,7 @@
           <a:cs typeface="+mn-cs"/>
         </a:defRPr>
       </a:lvl3pPr>
-      <a:lvl4pPr marL="1600200" indent="-228600" algn="l" defTabSz="914400" rtl="0" eaLnBrk="1" latinLnBrk="0" hangingPunct="1">
+      <a:lvl4pPr marL="1600055" indent="-228579" algn="l" defTabSz="914317" rtl="0" eaLnBrk="1" latinLnBrk="0" hangingPunct="1">
         <a:lnSpc>
           <a:spcPct val="90000"/>
         </a:lnSpc>
@@ -3140,7 +3140,7 @@
           <a:cs typeface="+mn-cs"/>
         </a:defRPr>
       </a:lvl4pPr>
-      <a:lvl5pPr marL="2057400" indent="-228600" algn="l" defTabSz="914400" rtl="0" eaLnBrk="1" latinLnBrk="0" hangingPunct="1">
+      <a:lvl5pPr marL="2057214" indent="-228579" algn="l" defTabSz="914317" rtl="0" eaLnBrk="1" latinLnBrk="0" hangingPunct="1">
         <a:lnSpc>
           <a:spcPct val="90000"/>
         </a:lnSpc>
@@ -3158,7 +3158,7 @@
           <a:cs typeface="+mn-cs"/>
         </a:defRPr>
       </a:lvl5pPr>
-      <a:lvl6pPr marL="2514600" indent="-228600" algn="l" defTabSz="914400" rtl="0" eaLnBrk="1" latinLnBrk="0" hangingPunct="1">
+      <a:lvl6pPr marL="2514372" indent="-228579" algn="l" defTabSz="914317" rtl="0" eaLnBrk="1" latinLnBrk="0" hangingPunct="1">
         <a:lnSpc>
           <a:spcPct val="90000"/>
         </a:lnSpc>
@@ -3176,7 +3176,7 @@
           <a:cs typeface="+mn-cs"/>
         </a:defRPr>
       </a:lvl6pPr>
-      <a:lvl7pPr marL="2971800" indent="-228600" algn="l" defTabSz="914400" rtl="0" eaLnBrk="1" latinLnBrk="0" hangingPunct="1">
+      <a:lvl7pPr marL="2971531" indent="-228579" algn="l" defTabSz="914317" rtl="0" eaLnBrk="1" latinLnBrk="0" hangingPunct="1">
         <a:lnSpc>
           <a:spcPct val="90000"/>
         </a:lnSpc>
@@ -3194,7 +3194,7 @@
           <a:cs typeface="+mn-cs"/>
         </a:defRPr>
       </a:lvl7pPr>
-      <a:lvl8pPr marL="3429000" indent="-228600" algn="l" defTabSz="914400" rtl="0" eaLnBrk="1" latinLnBrk="0" hangingPunct="1">
+      <a:lvl8pPr marL="3428689" indent="-228579" algn="l" defTabSz="914317" rtl="0" eaLnBrk="1" latinLnBrk="0" hangingPunct="1">
         <a:lnSpc>
           <a:spcPct val="90000"/>
         </a:lnSpc>
@@ -3212,7 +3212,7 @@
           <a:cs typeface="+mn-cs"/>
         </a:defRPr>
       </a:lvl8pPr>
-      <a:lvl9pPr marL="3886200" indent="-228600" algn="l" defTabSz="914400" rtl="0" eaLnBrk="1" latinLnBrk="0" hangingPunct="1">
+      <a:lvl9pPr marL="3885848" indent="-228579" algn="l" defTabSz="914317" rtl="0" eaLnBrk="1" latinLnBrk="0" hangingPunct="1">
         <a:lnSpc>
           <a:spcPct val="90000"/>
         </a:lnSpc>
@@ -3235,7 +3235,7 @@
       <a:defPPr>
         <a:defRPr lang="zh-CN"/>
       </a:defPPr>
-      <a:lvl1pPr marL="0" algn="l" defTabSz="914400" rtl="0" eaLnBrk="1" latinLnBrk="0" hangingPunct="1">
+      <a:lvl1pPr marL="0" algn="l" defTabSz="914317" rtl="0" eaLnBrk="1" latinLnBrk="0" hangingPunct="1">
         <a:defRPr sz="1800" kern="1200">
           <a:solidFill>
             <a:schemeClr val="tx1"/>
@@ -3245,7 +3245,7 @@
           <a:cs typeface="+mn-cs"/>
         </a:defRPr>
       </a:lvl1pPr>
-      <a:lvl2pPr marL="457200" algn="l" defTabSz="914400" rtl="0" eaLnBrk="1" latinLnBrk="0" hangingPunct="1">
+      <a:lvl2pPr marL="457159" algn="l" defTabSz="914317" rtl="0" eaLnBrk="1" latinLnBrk="0" hangingPunct="1">
         <a:defRPr sz="1800" kern="1200">
           <a:solidFill>
             <a:schemeClr val="tx1"/>
@@ -3255,7 +3255,7 @@
           <a:cs typeface="+mn-cs"/>
         </a:defRPr>
       </a:lvl2pPr>
-      <a:lvl3pPr marL="914400" algn="l" defTabSz="914400" rtl="0" eaLnBrk="1" latinLnBrk="0" hangingPunct="1">
+      <a:lvl3pPr marL="914317" algn="l" defTabSz="914317" rtl="0" eaLnBrk="1" latinLnBrk="0" hangingPunct="1">
         <a:defRPr sz="1800" kern="1200">
           <a:solidFill>
             <a:schemeClr val="tx1"/>
@@ -3265,7 +3265,7 @@
           <a:cs typeface="+mn-cs"/>
         </a:defRPr>
       </a:lvl3pPr>
-      <a:lvl4pPr marL="1371600" algn="l" defTabSz="914400" rtl="0" eaLnBrk="1" latinLnBrk="0" hangingPunct="1">
+      <a:lvl4pPr marL="1371476" algn="l" defTabSz="914317" rtl="0" eaLnBrk="1" latinLnBrk="0" hangingPunct="1">
         <a:defRPr sz="1800" kern="1200">
           <a:solidFill>
             <a:schemeClr val="tx1"/>
@@ -3275,7 +3275,7 @@
           <a:cs typeface="+mn-cs"/>
         </a:defRPr>
       </a:lvl4pPr>
-      <a:lvl5pPr marL="1828800" algn="l" defTabSz="914400" rtl="0" eaLnBrk="1" latinLnBrk="0" hangingPunct="1">
+      <a:lvl5pPr marL="1828634" algn="l" defTabSz="914317" rtl="0" eaLnBrk="1" latinLnBrk="0" hangingPunct="1">
         <a:defRPr sz="1800" kern="1200">
           <a:solidFill>
             <a:schemeClr val="tx1"/>
@@ -3285,7 +3285,7 @@
           <a:cs typeface="+mn-cs"/>
         </a:defRPr>
       </a:lvl5pPr>
-      <a:lvl6pPr marL="2286000" algn="l" defTabSz="914400" rtl="0" eaLnBrk="1" latinLnBrk="0" hangingPunct="1">
+      <a:lvl6pPr marL="2285793" algn="l" defTabSz="914317" rtl="0" eaLnBrk="1" latinLnBrk="0" hangingPunct="1">
         <a:defRPr sz="1800" kern="1200">
           <a:solidFill>
             <a:schemeClr val="tx1"/>
@@ -3295,7 +3295,7 @@
           <a:cs typeface="+mn-cs"/>
         </a:defRPr>
       </a:lvl6pPr>
-      <a:lvl7pPr marL="2743200" algn="l" defTabSz="914400" rtl="0" eaLnBrk="1" latinLnBrk="0" hangingPunct="1">
+      <a:lvl7pPr marL="2742951" algn="l" defTabSz="914317" rtl="0" eaLnBrk="1" latinLnBrk="0" hangingPunct="1">
         <a:defRPr sz="1800" kern="1200">
           <a:solidFill>
             <a:schemeClr val="tx1"/>
@@ -3305,7 +3305,7 @@
           <a:cs typeface="+mn-cs"/>
         </a:defRPr>
       </a:lvl7pPr>
-      <a:lvl8pPr marL="3200400" algn="l" defTabSz="914400" rtl="0" eaLnBrk="1" latinLnBrk="0" hangingPunct="1">
+      <a:lvl8pPr marL="3200110" algn="l" defTabSz="914317" rtl="0" eaLnBrk="1" latinLnBrk="0" hangingPunct="1">
         <a:defRPr sz="1800" kern="1200">
           <a:solidFill>
             <a:schemeClr val="tx1"/>
@@ -3315,7 +3315,7 @@
           <a:cs typeface="+mn-cs"/>
         </a:defRPr>
       </a:lvl8pPr>
-      <a:lvl9pPr marL="3657600" algn="l" defTabSz="914400" rtl="0" eaLnBrk="1" latinLnBrk="0" hangingPunct="1">
+      <a:lvl9pPr marL="3657269" algn="l" defTabSz="914317" rtl="0" eaLnBrk="1" latinLnBrk="0" hangingPunct="1">
         <a:defRPr sz="1800" kern="1200">
           <a:solidFill>
             <a:schemeClr val="tx1"/>
@@ -3361,7 +3361,7 @@
         </p:nvSpPr>
         <p:spPr>
           <a:xfrm>
-            <a:off x="537409" y="144378"/>
+            <a:off x="537409" y="106280"/>
             <a:ext cx="11213432" cy="4628743"/>
           </a:xfrm>
           <a:prstGeom prst="roundRect">
@@ -3465,7 +3465,7 @@
         </p:nvSpPr>
         <p:spPr>
           <a:xfrm rot="5400000">
-            <a:off x="1738333" y="2432833"/>
+            <a:off x="1738333" y="2432834"/>
             <a:ext cx="461665" cy="2162670"/>
           </a:xfrm>
           <a:prstGeom prst="rect">
@@ -3514,7 +3514,7 @@
         </p:nvSpPr>
         <p:spPr>
           <a:xfrm rot="5400000">
-            <a:off x="5047280" y="3111206"/>
+            <a:off x="5047280" y="3111209"/>
             <a:ext cx="461665" cy="2031101"/>
           </a:xfrm>
           <a:prstGeom prst="rect">
@@ -3565,9 +3565,9 @@
           <p:nvPr/>
         </p:nvCxnSpPr>
         <p:spPr>
-          <a:xfrm flipV="1">
-            <a:off x="1969166" y="2333163"/>
-            <a:ext cx="0" cy="950173"/>
+          <a:xfrm flipH="1" flipV="1">
+            <a:off x="1969166" y="2333167"/>
+            <a:ext cx="1" cy="950170"/>
           </a:xfrm>
           <a:prstGeom prst="straightConnector1">
             <a:avLst/>
@@ -3606,7 +3606,7 @@
         </p:nvSpPr>
         <p:spPr>
           <a:xfrm>
-            <a:off x="538977" y="4916367"/>
+            <a:off x="538977" y="4916369"/>
             <a:ext cx="11213432" cy="770929"/>
           </a:xfrm>
           <a:prstGeom prst="roundRect">
@@ -3646,7 +3646,7 @@
                   <a:srgbClr val="FF0000"/>
                 </a:solidFill>
               </a:rPr>
-              <a:t>Task</a:t>
+              <a:t>Model</a:t>
             </a:r>
             <a:endParaRPr lang="zh-CN" altLang="en-US" dirty="0">
               <a:solidFill>
@@ -3672,7 +3672,7 @@
         </p:nvCxnSpPr>
         <p:spPr>
           <a:xfrm>
-            <a:off x="2248375" y="3732376"/>
+            <a:off x="2248375" y="3732378"/>
             <a:ext cx="0" cy="1183991"/>
           </a:xfrm>
           <a:prstGeom prst="straightConnector1">
@@ -3715,8 +3715,8 @@
         </p:nvCxnSpPr>
         <p:spPr>
           <a:xfrm flipV="1">
-            <a:off x="6874290" y="2068084"/>
-            <a:ext cx="1145881" cy="4426"/>
+            <a:off x="6874290" y="2068088"/>
+            <a:ext cx="1145881" cy="4422"/>
           </a:xfrm>
           <a:prstGeom prst="straightConnector1">
             <a:avLst/>
@@ -3758,7 +3758,7 @@
         </p:nvCxnSpPr>
         <p:spPr>
           <a:xfrm>
-            <a:off x="8887482" y="2299034"/>
+            <a:off x="8909683" y="2092088"/>
             <a:ext cx="0" cy="844691"/>
           </a:xfrm>
           <a:prstGeom prst="line">
@@ -3783,12 +3783,138 @@
           </a:fontRef>
         </p:style>
       </p:cxnSp>
-      <p:sp>
-        <p:nvSpPr>
-          <p:cNvPr id="70" name="Isosceles Triangle 69">
-            <a:extLst>
-              <a:ext uri="{FF2B5EF4-FFF2-40B4-BE49-F238E27FC236}">
-                <a16:creationId xmlns:a16="http://schemas.microsoft.com/office/drawing/2014/main" id="{450CE672-17A0-46F3-9F77-878C0769CA06}"/>
+      <p:cxnSp>
+        <p:nvCxnSpPr>
+          <p:cNvPr id="72" name="Straight Arrow Connector 71">
+            <a:extLst>
+              <a:ext uri="{FF2B5EF4-FFF2-40B4-BE49-F238E27FC236}">
+                <a16:creationId xmlns:a16="http://schemas.microsoft.com/office/drawing/2014/main" id="{D2DA600E-0E07-4D0C-8B20-B67B8D3ECF1D}"/>
+              </a:ext>
+            </a:extLst>
+          </p:cNvPr>
+          <p:cNvCxnSpPr>
+            <a:cxnSpLocks/>
+            <a:stCxn id="6" idx="0"/>
+          </p:cNvCxnSpPr>
+          <p:nvPr/>
+        </p:nvCxnSpPr>
+        <p:spPr>
+          <a:xfrm flipV="1">
+            <a:off x="3050501" y="3490942"/>
+            <a:ext cx="4936597" cy="23228"/>
+          </a:xfrm>
+          <a:prstGeom prst="straightConnector1">
+            <a:avLst/>
+          </a:prstGeom>
+          <a:ln w="28575">
+            <a:prstDash val="sysDot"/>
+            <a:headEnd type="none" w="med" len="med"/>
+            <a:tailEnd type="arrow" w="med" len="med"/>
+          </a:ln>
+        </p:spPr>
+        <p:style>
+          <a:lnRef idx="1">
+            <a:schemeClr val="accent1"/>
+          </a:lnRef>
+          <a:fillRef idx="0">
+            <a:schemeClr val="accent1"/>
+          </a:fillRef>
+          <a:effectRef idx="0">
+            <a:schemeClr val="accent1"/>
+          </a:effectRef>
+          <a:fontRef idx="minor">
+            <a:schemeClr val="tx1"/>
+          </a:fontRef>
+        </p:style>
+      </p:cxnSp>
+      <p:cxnSp>
+        <p:nvCxnSpPr>
+          <p:cNvPr id="73" name="Straight Connector 72">
+            <a:extLst>
+              <a:ext uri="{FF2B5EF4-FFF2-40B4-BE49-F238E27FC236}">
+                <a16:creationId xmlns:a16="http://schemas.microsoft.com/office/drawing/2014/main" id="{C5D15119-838A-47F4-A072-962760F12732}"/>
+              </a:ext>
+            </a:extLst>
+          </p:cNvPr>
+          <p:cNvCxnSpPr>
+            <a:cxnSpLocks/>
+          </p:cNvCxnSpPr>
+          <p:nvPr/>
+        </p:nvCxnSpPr>
+        <p:spPr>
+          <a:xfrm flipV="1">
+            <a:off x="8460606" y="3924838"/>
+            <a:ext cx="0" cy="229878"/>
+          </a:xfrm>
+          <a:prstGeom prst="line">
+            <a:avLst/>
+          </a:prstGeom>
+          <a:ln w="28575">
+            <a:prstDash val="sysDot"/>
+          </a:ln>
+        </p:spPr>
+        <p:style>
+          <a:lnRef idx="1">
+            <a:schemeClr val="accent1"/>
+          </a:lnRef>
+          <a:fillRef idx="0">
+            <a:schemeClr val="accent1"/>
+          </a:fillRef>
+          <a:effectRef idx="0">
+            <a:schemeClr val="accent1"/>
+          </a:effectRef>
+          <a:fontRef idx="minor">
+            <a:schemeClr val="tx1"/>
+          </a:fontRef>
+        </p:style>
+      </p:cxnSp>
+      <p:cxnSp>
+        <p:nvCxnSpPr>
+          <p:cNvPr id="79" name="Straight Connector 78">
+            <a:extLst>
+              <a:ext uri="{FF2B5EF4-FFF2-40B4-BE49-F238E27FC236}">
+                <a16:creationId xmlns:a16="http://schemas.microsoft.com/office/drawing/2014/main" id="{F07CF001-19D5-4DB5-AF3A-4EBC482CA675}"/>
+              </a:ext>
+            </a:extLst>
+          </p:cNvPr>
+          <p:cNvCxnSpPr>
+            <a:cxnSpLocks/>
+          </p:cNvCxnSpPr>
+          <p:nvPr/>
+        </p:nvCxnSpPr>
+        <p:spPr>
+          <a:xfrm>
+            <a:off x="5424105" y="1313553"/>
+            <a:ext cx="0" cy="584807"/>
+          </a:xfrm>
+          <a:prstGeom prst="line">
+            <a:avLst/>
+          </a:prstGeom>
+          <a:ln w="28575">
+            <a:prstDash val="dash"/>
+          </a:ln>
+        </p:spPr>
+        <p:style>
+          <a:lnRef idx="1">
+            <a:schemeClr val="accent1"/>
+          </a:lnRef>
+          <a:fillRef idx="0">
+            <a:schemeClr val="accent1"/>
+          </a:fillRef>
+          <a:effectRef idx="0">
+            <a:schemeClr val="accent1"/>
+          </a:effectRef>
+          <a:fontRef idx="minor">
+            <a:schemeClr val="tx1"/>
+          </a:fontRef>
+        </p:style>
+      </p:cxnSp>
+      <p:sp>
+        <p:nvSpPr>
+          <p:cNvPr id="80" name="Isosceles Triangle 79">
+            <a:extLst>
+              <a:ext uri="{FF2B5EF4-FFF2-40B4-BE49-F238E27FC236}">
+                <a16:creationId xmlns:a16="http://schemas.microsoft.com/office/drawing/2014/main" id="{F632202B-FD32-48D0-A580-C133E00575E8}"/>
               </a:ext>
             </a:extLst>
           </p:cNvPr>
@@ -3796,8 +3922,8 @@
           <p:nvPr/>
         </p:nvSpPr>
         <p:spPr>
-          <a:xfrm rot="10800000">
-            <a:off x="8704603" y="2895371"/>
+          <a:xfrm>
+            <a:off x="5247216" y="1265424"/>
             <a:ext cx="365757" cy="269508"/>
           </a:xfrm>
           <a:prstGeom prst="triangle">
@@ -3837,24 +3963,23 @@
       </p:sp>
       <p:cxnSp>
         <p:nvCxnSpPr>
-          <p:cNvPr id="72" name="Straight Arrow Connector 71">
-            <a:extLst>
-              <a:ext uri="{FF2B5EF4-FFF2-40B4-BE49-F238E27FC236}">
-                <a16:creationId xmlns:a16="http://schemas.microsoft.com/office/drawing/2014/main" id="{D2DA600E-0E07-4D0C-8B20-B67B8D3ECF1D}"/>
+          <p:cNvPr id="102" name="Straight Arrow Connector 101">
+            <a:extLst>
+              <a:ext uri="{FF2B5EF4-FFF2-40B4-BE49-F238E27FC236}">
+                <a16:creationId xmlns:a16="http://schemas.microsoft.com/office/drawing/2014/main" id="{D5B8B343-B564-4696-A8B6-831FE08F79A2}"/>
               </a:ext>
             </a:extLst>
           </p:cNvPr>
           <p:cNvCxnSpPr>
             <a:cxnSpLocks/>
-            <a:stCxn id="6" idx="0"/>
-            <a:endCxn id="75" idx="2"/>
+            <a:endCxn id="9" idx="0"/>
           </p:cNvCxnSpPr>
           <p:nvPr/>
         </p:nvCxnSpPr>
         <p:spPr>
-          <a:xfrm>
-            <a:off x="3050501" y="3514169"/>
-            <a:ext cx="5097285" cy="10875"/>
+          <a:xfrm flipH="1" flipV="1">
+            <a:off x="6293663" y="4126760"/>
+            <a:ext cx="2166947" cy="28915"/>
           </a:xfrm>
           <a:prstGeom prst="straightConnector1">
             <a:avLst/>
@@ -3880,53 +4005,12 @@
           </a:fontRef>
         </p:style>
       </p:cxnSp>
-      <p:cxnSp>
-        <p:nvCxnSpPr>
-          <p:cNvPr id="73" name="Straight Connector 72">
-            <a:extLst>
-              <a:ext uri="{FF2B5EF4-FFF2-40B4-BE49-F238E27FC236}">
-                <a16:creationId xmlns:a16="http://schemas.microsoft.com/office/drawing/2014/main" id="{C5D15119-838A-47F4-A072-962760F12732}"/>
-              </a:ext>
-            </a:extLst>
-          </p:cNvPr>
-          <p:cNvCxnSpPr>
-            <a:cxnSpLocks/>
-          </p:cNvCxnSpPr>
-          <p:nvPr/>
-        </p:nvCxnSpPr>
-        <p:spPr>
-          <a:xfrm flipV="1">
-            <a:off x="8460606" y="3924838"/>
-            <a:ext cx="0" cy="229878"/>
-          </a:xfrm>
-          <a:prstGeom prst="line">
-            <a:avLst/>
-          </a:prstGeom>
-          <a:ln w="28575">
-            <a:prstDash val="sysDot"/>
-          </a:ln>
-        </p:spPr>
-        <p:style>
-          <a:lnRef idx="1">
-            <a:schemeClr val="accent1"/>
-          </a:lnRef>
-          <a:fillRef idx="0">
-            <a:schemeClr val="accent1"/>
-          </a:fillRef>
-          <a:effectRef idx="0">
-            <a:schemeClr val="accent1"/>
-          </a:effectRef>
-          <a:fontRef idx="minor">
-            <a:schemeClr val="tx1"/>
-          </a:fontRef>
-        </p:style>
-      </p:cxnSp>
-      <p:sp>
-        <p:nvSpPr>
-          <p:cNvPr id="75" name="TextBox 74">
-            <a:extLst>
-              <a:ext uri="{FF2B5EF4-FFF2-40B4-BE49-F238E27FC236}">
-                <a16:creationId xmlns:a16="http://schemas.microsoft.com/office/drawing/2014/main" id="{4BF59EDD-9118-4385-A61F-4683D5AB8117}"/>
+      <p:sp>
+        <p:nvSpPr>
+          <p:cNvPr id="108" name="TextBox 107">
+            <a:extLst>
+              <a:ext uri="{FF2B5EF4-FFF2-40B4-BE49-F238E27FC236}">
+                <a16:creationId xmlns:a16="http://schemas.microsoft.com/office/drawing/2014/main" id="{786084DE-D08B-459A-A650-397ACF5498D8}"/>
               </a:ext>
             </a:extLst>
           </p:cNvPr>
@@ -3934,97 +4018,143 @@
           <p:nvPr/>
         </p:nvSpPr>
         <p:spPr>
-          <a:xfrm rot="5400000">
-            <a:off x="8501238" y="2802259"/>
-            <a:ext cx="738664" cy="1445569"/>
+          <a:xfrm>
+            <a:off x="1597692" y="2327740"/>
+            <a:ext cx="375268" cy="369332"/>
           </a:xfrm>
           <a:prstGeom prst="rect">
             <a:avLst/>
           </a:prstGeom>
-        </p:spPr>
-        <p:style>
-          <a:lnRef idx="0">
-            <a:schemeClr val="accent1"/>
-          </a:lnRef>
-          <a:fillRef idx="3">
-            <a:schemeClr val="accent1"/>
-          </a:fillRef>
-          <a:effectRef idx="3">
-            <a:schemeClr val="accent1"/>
-          </a:effectRef>
-          <a:fontRef idx="minor">
-            <a:schemeClr val="lt1"/>
-          </a:fontRef>
-        </p:style>
-        <p:txBody>
-          <a:bodyPr vert="vert270" wrap="square" rtlCol="0">
+          <a:noFill/>
+        </p:spPr>
+        <p:txBody>
+          <a:bodyPr wrap="square" rtlCol="0">
             <a:spAutoFit/>
           </a:bodyPr>
           <a:lstStyle/>
           <a:p>
-            <a:pPr algn="ctr"/>
-            <a:r>
-              <a:rPr lang="en-SG" altLang="zh-CN" dirty="0"/>
-              <a:t>{abstract}</a:t>
-            </a:r>
-          </a:p>
-          <a:p>
-            <a:pPr algn="ctr"/>
-            <a:r>
-              <a:rPr lang="en-SG" altLang="zh-CN" dirty="0"/>
-              <a:t>Command</a:t>
-            </a:r>
-            <a:endParaRPr lang="zh-CN" altLang="en-US" dirty="0"/>
-          </a:p>
-        </p:txBody>
-      </p:sp>
-      <p:cxnSp>
-        <p:nvCxnSpPr>
-          <p:cNvPr id="79" name="Straight Connector 78">
-            <a:extLst>
-              <a:ext uri="{FF2B5EF4-FFF2-40B4-BE49-F238E27FC236}">
-                <a16:creationId xmlns:a16="http://schemas.microsoft.com/office/drawing/2014/main" id="{F07CF001-19D5-4DB5-AF3A-4EBC482CA675}"/>
-              </a:ext>
-            </a:extLst>
-          </p:cNvPr>
-          <p:cNvCxnSpPr>
-            <a:cxnSpLocks/>
-          </p:cNvCxnSpPr>
+            <a:r>
+              <a:rPr lang="en-US" altLang="zh-CN" b="1" dirty="0">
+                <a:solidFill>
+                  <a:schemeClr val="accent1">
+                    <a:lumMod val="75000"/>
+                  </a:schemeClr>
+                </a:solidFill>
+              </a:rPr>
+              <a:t>1</a:t>
+            </a:r>
+            <a:endParaRPr lang="zh-CN" altLang="en-US" b="1" dirty="0">
+              <a:solidFill>
+                <a:schemeClr val="accent1">
+                  <a:lumMod val="75000"/>
+                </a:schemeClr>
+              </a:solidFill>
+            </a:endParaRPr>
+          </a:p>
+        </p:txBody>
+      </p:sp>
+      <p:sp>
+        <p:nvSpPr>
+          <p:cNvPr id="109" name="TextBox 108">
+            <a:extLst>
+              <a:ext uri="{FF2B5EF4-FFF2-40B4-BE49-F238E27FC236}">
+                <a16:creationId xmlns:a16="http://schemas.microsoft.com/office/drawing/2014/main" id="{3571825F-18A0-427A-9D6E-5472D6D5F45F}"/>
+              </a:ext>
+            </a:extLst>
+          </p:cNvPr>
+          <p:cNvSpPr txBox="1"/>
           <p:nvPr/>
-        </p:nvCxnSpPr>
+        </p:nvSpPr>
         <p:spPr>
           <a:xfrm>
-            <a:off x="5424105" y="1313550"/>
-            <a:ext cx="0" cy="584807"/>
-          </a:xfrm>
-          <a:prstGeom prst="line">
+            <a:off x="6719032" y="3138535"/>
+            <a:ext cx="1337313" cy="369332"/>
+          </a:xfrm>
+          <a:prstGeom prst="rect">
             <a:avLst/>
           </a:prstGeom>
-          <a:ln w="28575">
-            <a:prstDash val="dash"/>
-          </a:ln>
-        </p:spPr>
-        <p:style>
-          <a:lnRef idx="1">
-            <a:schemeClr val="accent1"/>
-          </a:lnRef>
-          <a:fillRef idx="0">
-            <a:schemeClr val="accent1"/>
-          </a:fillRef>
-          <a:effectRef idx="0">
-            <a:schemeClr val="accent1"/>
-          </a:effectRef>
-          <a:fontRef idx="minor">
-            <a:schemeClr val="tx1"/>
-          </a:fontRef>
-        </p:style>
-      </p:cxnSp>
-      <p:sp>
-        <p:nvSpPr>
-          <p:cNvPr id="80" name="Isosceles Triangle 79">
-            <a:extLst>
-              <a:ext uri="{FF2B5EF4-FFF2-40B4-BE49-F238E27FC236}">
-                <a16:creationId xmlns:a16="http://schemas.microsoft.com/office/drawing/2014/main" id="{F632202B-FD32-48D0-A580-C133E00575E8}"/>
+          <a:noFill/>
+        </p:spPr>
+        <p:txBody>
+          <a:bodyPr wrap="square" rtlCol="0">
+            <a:spAutoFit/>
+          </a:bodyPr>
+          <a:lstStyle/>
+          <a:p>
+            <a:r>
+              <a:rPr lang="en-US" altLang="zh-CN" b="1" dirty="0">
+                <a:solidFill>
+                  <a:schemeClr val="accent1">
+                    <a:lumMod val="75000"/>
+                  </a:schemeClr>
+                </a:solidFill>
+              </a:rPr>
+              <a:t>executes</a:t>
+            </a:r>
+            <a:endParaRPr lang="zh-CN" altLang="en-US" b="1" dirty="0">
+              <a:solidFill>
+                <a:schemeClr val="accent1">
+                  <a:lumMod val="75000"/>
+                </a:schemeClr>
+              </a:solidFill>
+            </a:endParaRPr>
+          </a:p>
+        </p:txBody>
+      </p:sp>
+      <p:sp>
+        <p:nvSpPr>
+          <p:cNvPr id="113" name="TextBox 112">
+            <a:extLst>
+              <a:ext uri="{FF2B5EF4-FFF2-40B4-BE49-F238E27FC236}">
+                <a16:creationId xmlns:a16="http://schemas.microsoft.com/office/drawing/2014/main" id="{A9824DAC-702B-441A-8565-3617994EDDEC}"/>
+              </a:ext>
+            </a:extLst>
+          </p:cNvPr>
+          <p:cNvSpPr txBox="1"/>
+          <p:nvPr/>
+        </p:nvSpPr>
+        <p:spPr>
+          <a:xfrm>
+            <a:off x="6776399" y="3798847"/>
+            <a:ext cx="1337313" cy="369332"/>
+          </a:xfrm>
+          <a:prstGeom prst="rect">
+            <a:avLst/>
+          </a:prstGeom>
+          <a:noFill/>
+        </p:spPr>
+        <p:txBody>
+          <a:bodyPr wrap="square" rtlCol="0">
+            <a:spAutoFit/>
+          </a:bodyPr>
+          <a:lstStyle/>
+          <a:p>
+            <a:r>
+              <a:rPr lang="en-US" altLang="zh-CN" b="1" dirty="0">
+                <a:solidFill>
+                  <a:schemeClr val="accent1">
+                    <a:lumMod val="75000"/>
+                  </a:schemeClr>
+                </a:solidFill>
+              </a:rPr>
+              <a:t>produces</a:t>
+            </a:r>
+            <a:endParaRPr lang="zh-CN" altLang="en-US" b="1" dirty="0">
+              <a:solidFill>
+                <a:schemeClr val="accent1">
+                  <a:lumMod val="75000"/>
+                </a:schemeClr>
+              </a:solidFill>
+            </a:endParaRPr>
+          </a:p>
+        </p:txBody>
+      </p:sp>
+      <p:sp>
+        <p:nvSpPr>
+          <p:cNvPr id="115" name="Isosceles Triangle 114">
+            <a:extLst>
+              <a:ext uri="{FF2B5EF4-FFF2-40B4-BE49-F238E27FC236}">
+                <a16:creationId xmlns:a16="http://schemas.microsoft.com/office/drawing/2014/main" id="{C3ACE1A1-9150-4841-8E53-16F516FCA437}"/>
               </a:ext>
             </a:extLst>
           </p:cNvPr>
@@ -4032,18 +4162,15 @@
           <p:nvPr/>
         </p:nvSpPr>
         <p:spPr>
-          <a:xfrm>
-            <a:off x="5247216" y="1265424"/>
-            <a:ext cx="365757" cy="269508"/>
+          <a:xfrm rot="5400000">
+            <a:off x="7762244" y="3252769"/>
+            <a:ext cx="155565" cy="152371"/>
           </a:xfrm>
           <a:prstGeom prst="triangle">
             <a:avLst/>
           </a:prstGeom>
           <a:solidFill>
-            <a:schemeClr val="accent1">
-              <a:lumMod val="60000"/>
-              <a:lumOff val="40000"/>
-            </a:schemeClr>
+            <a:schemeClr val="tx2"/>
           </a:solidFill>
         </p:spPr>
         <p:style>
@@ -4071,25 +4198,73 @@
           </a:p>
         </p:txBody>
       </p:sp>
+      <p:sp>
+        <p:nvSpPr>
+          <p:cNvPr id="116" name="Isosceles Triangle 115">
+            <a:extLst>
+              <a:ext uri="{FF2B5EF4-FFF2-40B4-BE49-F238E27FC236}">
+                <a16:creationId xmlns:a16="http://schemas.microsoft.com/office/drawing/2014/main" id="{8FCB8D2D-83EF-4A27-92B1-9C963BBD930A}"/>
+              </a:ext>
+            </a:extLst>
+          </p:cNvPr>
+          <p:cNvSpPr/>
+          <p:nvPr/>
+        </p:nvSpPr>
+        <p:spPr>
+          <a:xfrm rot="16200000">
+            <a:off x="6638960" y="3930177"/>
+            <a:ext cx="155565" cy="152371"/>
+          </a:xfrm>
+          <a:prstGeom prst="triangle">
+            <a:avLst/>
+          </a:prstGeom>
+          <a:solidFill>
+            <a:schemeClr val="tx2"/>
+          </a:solidFill>
+        </p:spPr>
+        <p:style>
+          <a:lnRef idx="2">
+            <a:schemeClr val="accent1">
+              <a:shade val="50000"/>
+            </a:schemeClr>
+          </a:lnRef>
+          <a:fillRef idx="1">
+            <a:schemeClr val="accent1"/>
+          </a:fillRef>
+          <a:effectRef idx="0">
+            <a:schemeClr val="accent1"/>
+          </a:effectRef>
+          <a:fontRef idx="minor">
+            <a:schemeClr val="lt1"/>
+          </a:fontRef>
+        </p:style>
+        <p:txBody>
+          <a:bodyPr rtlCol="0" anchor="ctr"/>
+          <a:lstStyle/>
+          <a:p>
+            <a:pPr algn="ctr"/>
+            <a:endParaRPr lang="en-SG"/>
+          </a:p>
+        </p:txBody>
+      </p:sp>
       <p:cxnSp>
         <p:nvCxnSpPr>
-          <p:cNvPr id="102" name="Straight Arrow Connector 101">
-            <a:extLst>
-              <a:ext uri="{FF2B5EF4-FFF2-40B4-BE49-F238E27FC236}">
-                <a16:creationId xmlns:a16="http://schemas.microsoft.com/office/drawing/2014/main" id="{D5B8B343-B564-4696-A8B6-831FE08F79A2}"/>
+          <p:cNvPr id="126" name="Straight Arrow Connector 125">
+            <a:extLst>
+              <a:ext uri="{FF2B5EF4-FFF2-40B4-BE49-F238E27FC236}">
+                <a16:creationId xmlns:a16="http://schemas.microsoft.com/office/drawing/2014/main" id="{667E11DF-D3C3-4D6A-BF42-46AB373FDA49}"/>
               </a:ext>
             </a:extLst>
           </p:cNvPr>
           <p:cNvCxnSpPr>
             <a:cxnSpLocks/>
-            <a:endCxn id="9" idx="0"/>
           </p:cNvCxnSpPr>
           <p:nvPr/>
         </p:nvCxnSpPr>
         <p:spPr>
-          <a:xfrm flipH="1" flipV="1">
-            <a:off x="6293663" y="4126757"/>
-            <a:ext cx="2166944" cy="28914"/>
+          <a:xfrm>
+            <a:off x="8909026" y="3894378"/>
+            <a:ext cx="0" cy="1021991"/>
           </a:xfrm>
           <a:prstGeom prst="straightConnector1">
             <a:avLst/>
@@ -4117,10 +4292,10 @@
       </p:cxnSp>
       <p:sp>
         <p:nvSpPr>
-          <p:cNvPr id="108" name="TextBox 107">
-            <a:extLst>
-              <a:ext uri="{FF2B5EF4-FFF2-40B4-BE49-F238E27FC236}">
-                <a16:creationId xmlns:a16="http://schemas.microsoft.com/office/drawing/2014/main" id="{786084DE-D08B-459A-A650-397ACF5498D8}"/>
+          <p:cNvPr id="60" name="TextBox 59">
+            <a:extLst>
+              <a:ext uri="{FF2B5EF4-FFF2-40B4-BE49-F238E27FC236}">
+                <a16:creationId xmlns:a16="http://schemas.microsoft.com/office/drawing/2014/main" id="{E39A0DF4-B41C-48F2-8C6C-B654EB128408}"/>
               </a:ext>
             </a:extLst>
           </p:cNvPr>
@@ -4128,9 +4303,139 @@
           <p:nvPr/>
         </p:nvSpPr>
         <p:spPr>
+          <a:xfrm rot="5400000">
+            <a:off x="5054772" y="-70075"/>
+            <a:ext cx="738664" cy="1893139"/>
+          </a:xfrm>
+          <a:prstGeom prst="rect">
+            <a:avLst/>
+          </a:prstGeom>
+        </p:spPr>
+        <p:style>
+          <a:lnRef idx="0">
+            <a:schemeClr val="accent1"/>
+          </a:lnRef>
+          <a:fillRef idx="3">
+            <a:schemeClr val="accent1"/>
+          </a:fillRef>
+          <a:effectRef idx="3">
+            <a:schemeClr val="accent1"/>
+          </a:effectRef>
+          <a:fontRef idx="minor">
+            <a:schemeClr val="lt1"/>
+          </a:fontRef>
+        </p:style>
+        <p:txBody>
+          <a:bodyPr vert="vert270" wrap="square" rtlCol="0">
+            <a:spAutoFit/>
+          </a:bodyPr>
+          <a:lstStyle/>
+          <a:p>
+            <a:pPr algn="ctr"/>
+            <a:r>
+              <a:rPr lang="en-SG" altLang="zh-CN" dirty="0"/>
+              <a:t>&lt;&lt;interface&gt;&gt;</a:t>
+            </a:r>
+          </a:p>
+          <a:p>
+            <a:pPr algn="ctr"/>
+            <a:r>
+              <a:rPr lang="en-SG" altLang="zh-CN" dirty="0"/>
+              <a:t>CommandParser</a:t>
+            </a:r>
+            <a:endParaRPr lang="zh-CN" altLang="en-US" dirty="0"/>
+          </a:p>
+        </p:txBody>
+      </p:sp>
+      <p:sp>
+        <p:nvSpPr>
+          <p:cNvPr id="61" name="TextBox 60">
+            <a:extLst>
+              <a:ext uri="{FF2B5EF4-FFF2-40B4-BE49-F238E27FC236}">
+                <a16:creationId xmlns:a16="http://schemas.microsoft.com/office/drawing/2014/main" id="{B700D8CE-41F9-4442-B0D4-BB51F18F9300}"/>
+              </a:ext>
+            </a:extLst>
+          </p:cNvPr>
+          <p:cNvSpPr txBox="1"/>
+          <p:nvPr/>
+        </p:nvSpPr>
+        <p:spPr>
+          <a:xfrm rot="5400000">
+            <a:off x="7778690" y="2014955"/>
+            <a:ext cx="2123658" cy="1744712"/>
+          </a:xfrm>
+          <a:prstGeom prst="rect">
+            <a:avLst/>
+          </a:prstGeom>
+        </p:spPr>
+        <p:style>
+          <a:lnRef idx="0">
+            <a:schemeClr val="accent1"/>
+          </a:lnRef>
+          <a:fillRef idx="3">
+            <a:schemeClr val="accent1"/>
+          </a:fillRef>
+          <a:effectRef idx="3">
+            <a:schemeClr val="accent1"/>
+          </a:effectRef>
+          <a:fontRef idx="minor">
+            <a:schemeClr val="lt1"/>
+          </a:fontRef>
+        </p:style>
+        <p:txBody>
+          <a:bodyPr vert="vert270" wrap="square" rtlCol="0">
+            <a:spAutoFit/>
+          </a:bodyPr>
+          <a:lstStyle/>
+          <a:p>
+            <a:pPr algn="ctr"/>
+            <a:endParaRPr lang="en-SG" altLang="zh-CN" dirty="0"/>
+          </a:p>
+          <a:p>
+            <a:pPr algn="ctr"/>
+            <a:endParaRPr lang="en-SG" altLang="zh-CN" dirty="0"/>
+          </a:p>
+          <a:p>
+            <a:pPr algn="ctr"/>
+            <a:endParaRPr lang="en-SG" altLang="zh-CN" dirty="0"/>
+          </a:p>
+          <a:p>
+            <a:pPr algn="ctr"/>
+            <a:r>
+              <a:rPr lang="en-SG" altLang="zh-CN" dirty="0"/>
+              <a:t>XYZCommand</a:t>
+            </a:r>
+          </a:p>
+          <a:p>
+            <a:pPr algn="ctr"/>
+            <a:endParaRPr lang="en-SG" altLang="zh-CN" dirty="0"/>
+          </a:p>
+          <a:p>
+            <a:pPr algn="ctr"/>
+            <a:endParaRPr lang="en-SG" altLang="zh-CN" dirty="0"/>
+          </a:p>
+          <a:p>
+            <a:pPr algn="ctr"/>
+            <a:endParaRPr lang="zh-CN" altLang="en-US" dirty="0"/>
+          </a:p>
+        </p:txBody>
+      </p:sp>
+      <p:sp>
+        <p:nvSpPr>
+          <p:cNvPr id="62" name="TextBox 61">
+            <a:extLst>
+              <a:ext uri="{FF2B5EF4-FFF2-40B4-BE49-F238E27FC236}">
+                <a16:creationId xmlns:a16="http://schemas.microsoft.com/office/drawing/2014/main" id="{4F0B51F9-AA25-443A-9424-21122955F54A}"/>
+              </a:ext>
+            </a:extLst>
+          </p:cNvPr>
+          <p:cNvSpPr txBox="1"/>
+          <p:nvPr/>
+        </p:nvSpPr>
+        <p:spPr>
           <a:xfrm>
-            <a:off x="1597692" y="2327740"/>
-            <a:ext cx="375268" cy="369332"/>
+            <a:off x="6846426" y="2006041"/>
+            <a:ext cx="1192237" cy="369332"/>
           </a:xfrm>
           <a:prstGeom prst="rect">
             <a:avLst/>
@@ -4151,7 +4456,7 @@
                   </a:schemeClr>
                 </a:solidFill>
               </a:rPr>
-              <a:t>1</a:t>
+              <a:t>creates</a:t>
             </a:r>
             <a:endParaRPr lang="zh-CN" altLang="en-US" b="1" dirty="0">
               <a:solidFill>
@@ -4165,106 +4470,10 @@
       </p:sp>
       <p:sp>
         <p:nvSpPr>
-          <p:cNvPr id="109" name="TextBox 108">
-            <a:extLst>
-              <a:ext uri="{FF2B5EF4-FFF2-40B4-BE49-F238E27FC236}">
-                <a16:creationId xmlns:a16="http://schemas.microsoft.com/office/drawing/2014/main" id="{3571825F-18A0-427A-9D6E-5472D6D5F45F}"/>
-              </a:ext>
-            </a:extLst>
-          </p:cNvPr>
-          <p:cNvSpPr txBox="1"/>
-          <p:nvPr/>
-        </p:nvSpPr>
-        <p:spPr>
-          <a:xfrm>
-            <a:off x="6719032" y="3138535"/>
-            <a:ext cx="1337313" cy="369332"/>
-          </a:xfrm>
-          <a:prstGeom prst="rect">
-            <a:avLst/>
-          </a:prstGeom>
-          <a:noFill/>
-        </p:spPr>
-        <p:txBody>
-          <a:bodyPr wrap="square" rtlCol="0">
-            <a:spAutoFit/>
-          </a:bodyPr>
-          <a:lstStyle/>
-          <a:p>
-            <a:r>
-              <a:rPr lang="en-US" altLang="zh-CN" b="1" dirty="0">
-                <a:solidFill>
-                  <a:schemeClr val="accent1">
-                    <a:lumMod val="75000"/>
-                  </a:schemeClr>
-                </a:solidFill>
-              </a:rPr>
-              <a:t>executes</a:t>
-            </a:r>
-            <a:endParaRPr lang="zh-CN" altLang="en-US" b="1" dirty="0">
-              <a:solidFill>
-                <a:schemeClr val="accent1">
-                  <a:lumMod val="75000"/>
-                </a:schemeClr>
-              </a:solidFill>
-            </a:endParaRPr>
-          </a:p>
-        </p:txBody>
-      </p:sp>
-      <p:sp>
-        <p:nvSpPr>
-          <p:cNvPr id="113" name="TextBox 112">
-            <a:extLst>
-              <a:ext uri="{FF2B5EF4-FFF2-40B4-BE49-F238E27FC236}">
-                <a16:creationId xmlns:a16="http://schemas.microsoft.com/office/drawing/2014/main" id="{A9824DAC-702B-441A-8565-3617994EDDEC}"/>
-              </a:ext>
-            </a:extLst>
-          </p:cNvPr>
-          <p:cNvSpPr txBox="1"/>
-          <p:nvPr/>
-        </p:nvSpPr>
-        <p:spPr>
-          <a:xfrm>
-            <a:off x="6776399" y="3798846"/>
-            <a:ext cx="1337313" cy="369332"/>
-          </a:xfrm>
-          <a:prstGeom prst="rect">
-            <a:avLst/>
-          </a:prstGeom>
-          <a:noFill/>
-        </p:spPr>
-        <p:txBody>
-          <a:bodyPr wrap="square" rtlCol="0">
-            <a:spAutoFit/>
-          </a:bodyPr>
-          <a:lstStyle/>
-          <a:p>
-            <a:r>
-              <a:rPr lang="en-US" altLang="zh-CN" b="1" dirty="0">
-                <a:solidFill>
-                  <a:schemeClr val="accent1">
-                    <a:lumMod val="75000"/>
-                  </a:schemeClr>
-                </a:solidFill>
-              </a:rPr>
-              <a:t>produces</a:t>
-            </a:r>
-            <a:endParaRPr lang="zh-CN" altLang="en-US" b="1" dirty="0">
-              <a:solidFill>
-                <a:schemeClr val="accent1">
-                  <a:lumMod val="75000"/>
-                </a:schemeClr>
-              </a:solidFill>
-            </a:endParaRPr>
-          </a:p>
-        </p:txBody>
-      </p:sp>
-      <p:sp>
-        <p:nvSpPr>
-          <p:cNvPr id="115" name="Isosceles Triangle 114">
-            <a:extLst>
-              <a:ext uri="{FF2B5EF4-FFF2-40B4-BE49-F238E27FC236}">
-                <a16:creationId xmlns:a16="http://schemas.microsoft.com/office/drawing/2014/main" id="{C3ACE1A1-9150-4841-8E53-16F516FCA437}"/>
+          <p:cNvPr id="63" name="Isosceles Triangle 62">
+            <a:extLst>
+              <a:ext uri="{FF2B5EF4-FFF2-40B4-BE49-F238E27FC236}">
+                <a16:creationId xmlns:a16="http://schemas.microsoft.com/office/drawing/2014/main" id="{0F87F7C4-A86C-4972-9BDB-D2B454FA3EB3}"/>
               </a:ext>
             </a:extLst>
           </p:cNvPr>
@@ -4273,7 +4482,7 @@
         </p:nvSpPr>
         <p:spPr>
           <a:xfrm rot="5400000">
-            <a:off x="7762244" y="3252766"/>
+            <a:off x="7716629" y="2145744"/>
             <a:ext cx="155565" cy="152371"/>
           </a:xfrm>
           <a:prstGeom prst="triangle">
@@ -4310,10 +4519,10 @@
       </p:sp>
       <p:sp>
         <p:nvSpPr>
-          <p:cNvPr id="116" name="Isosceles Triangle 115">
-            <a:extLst>
-              <a:ext uri="{FF2B5EF4-FFF2-40B4-BE49-F238E27FC236}">
-                <a16:creationId xmlns:a16="http://schemas.microsoft.com/office/drawing/2014/main" id="{8FCB8D2D-83EF-4A27-92B1-9C963BBD930A}"/>
+          <p:cNvPr id="64" name="Isosceles Triangle 63">
+            <a:extLst>
+              <a:ext uri="{FF2B5EF4-FFF2-40B4-BE49-F238E27FC236}">
+                <a16:creationId xmlns:a16="http://schemas.microsoft.com/office/drawing/2014/main" id="{2DC17196-6EAA-4460-87BE-3F67F7C5031F}"/>
               </a:ext>
             </a:extLst>
           </p:cNvPr>
@@ -4321,8 +4530,8 @@
           <p:nvPr/>
         </p:nvSpPr>
         <p:spPr>
-          <a:xfrm rot="16200000">
-            <a:off x="6638960" y="3930174"/>
+          <a:xfrm rot="5400000">
+            <a:off x="3964823" y="2125726"/>
             <a:ext cx="155565" cy="152371"/>
           </a:xfrm>
           <a:prstGeom prst="triangle">
@@ -4359,22 +4568,23 @@
       </p:sp>
       <p:cxnSp>
         <p:nvCxnSpPr>
-          <p:cNvPr id="126" name="Straight Arrow Connector 125">
-            <a:extLst>
-              <a:ext uri="{FF2B5EF4-FFF2-40B4-BE49-F238E27FC236}">
-                <a16:creationId xmlns:a16="http://schemas.microsoft.com/office/drawing/2014/main" id="{667E11DF-D3C3-4D6A-BF42-46AB373FDA49}"/>
+          <p:cNvPr id="65" name="Straight Arrow Connector 64">
+            <a:extLst>
+              <a:ext uri="{FF2B5EF4-FFF2-40B4-BE49-F238E27FC236}">
+                <a16:creationId xmlns:a16="http://schemas.microsoft.com/office/drawing/2014/main" id="{34EC03B2-1464-40A3-972F-8489A9762E55}"/>
               </a:ext>
             </a:extLst>
           </p:cNvPr>
           <p:cNvCxnSpPr>
             <a:cxnSpLocks/>
+            <a:endCxn id="67" idx="2"/>
           </p:cNvCxnSpPr>
           <p:nvPr/>
         </p:nvCxnSpPr>
         <p:spPr>
-          <a:xfrm>
-            <a:off x="8909026" y="3894376"/>
-            <a:ext cx="0" cy="1021991"/>
+          <a:xfrm flipV="1">
+            <a:off x="2819275" y="2072510"/>
+            <a:ext cx="1834143" cy="3444"/>
           </a:xfrm>
           <a:prstGeom prst="straightConnector1">
             <a:avLst/>
@@ -4402,10 +4612,10 @@
       </p:cxnSp>
       <p:sp>
         <p:nvSpPr>
-          <p:cNvPr id="60" name="TextBox 59">
-            <a:extLst>
-              <a:ext uri="{FF2B5EF4-FFF2-40B4-BE49-F238E27FC236}">
-                <a16:creationId xmlns:a16="http://schemas.microsoft.com/office/drawing/2014/main" id="{E39A0DF4-B41C-48F2-8C6C-B654EB128408}"/>
+          <p:cNvPr id="66" name="TextBox 65">
+            <a:extLst>
+              <a:ext uri="{FF2B5EF4-FFF2-40B4-BE49-F238E27FC236}">
+                <a16:creationId xmlns:a16="http://schemas.microsoft.com/office/drawing/2014/main" id="{00B96983-F9F7-418F-BA69-5D3372CF55AB}"/>
               </a:ext>
             </a:extLst>
           </p:cNvPr>
@@ -4414,8 +4624,8 @@
         </p:nvSpPr>
         <p:spPr>
           <a:xfrm rot="5400000">
-            <a:off x="5054772" y="-70075"/>
-            <a:ext cx="738664" cy="1893139"/>
+            <a:off x="1714513" y="1015505"/>
+            <a:ext cx="461665" cy="2105394"/>
           </a:xfrm>
           <a:prstGeom prst="rect">
             <a:avLst/>
@@ -4444,25 +4654,17 @@
             <a:pPr algn="ctr"/>
             <a:r>
               <a:rPr lang="en-SG" altLang="zh-CN" dirty="0"/>
-              <a:t>&lt;&lt;interface&gt;&gt;</a:t>
-            </a:r>
-          </a:p>
-          <a:p>
-            <a:pPr algn="ctr"/>
-            <a:r>
-              <a:rPr lang="en-SG" altLang="zh-CN" dirty="0"/>
-              <a:t>CommandParser</a:t>
-            </a:r>
-            <a:endParaRPr lang="zh-CN" altLang="en-US" dirty="0"/>
-          </a:p>
-        </p:txBody>
-      </p:sp>
-      <p:sp>
-        <p:nvSpPr>
-          <p:cNvPr id="61" name="TextBox 60">
-            <a:extLst>
-              <a:ext uri="{FF2B5EF4-FFF2-40B4-BE49-F238E27FC236}">
-                <a16:creationId xmlns:a16="http://schemas.microsoft.com/office/drawing/2014/main" id="{B700D8CE-41F9-4442-B0D4-BB51F18F9300}"/>
+              <a:t>ParserManager</a:t>
+            </a:r>
+          </a:p>
+        </p:txBody>
+      </p:sp>
+      <p:sp>
+        <p:nvSpPr>
+          <p:cNvPr id="67" name="TextBox 66">
+            <a:extLst>
+              <a:ext uri="{FF2B5EF4-FFF2-40B4-BE49-F238E27FC236}">
+                <a16:creationId xmlns:a16="http://schemas.microsoft.com/office/drawing/2014/main" id="{4DEFB2E9-709C-449B-A7F9-C4A292C49945}"/>
               </a:ext>
             </a:extLst>
           </p:cNvPr>
@@ -4471,8 +4673,8 @@
         </p:nvSpPr>
         <p:spPr>
           <a:xfrm rot="5400000">
-            <a:off x="8678194" y="1146552"/>
-            <a:ext cx="461665" cy="1843857"/>
+            <a:off x="5533021" y="962073"/>
+            <a:ext cx="461665" cy="2220872"/>
           </a:xfrm>
           <a:prstGeom prst="rect">
             <a:avLst/>
@@ -4501,7 +4703,7 @@
             <a:pPr algn="ctr"/>
             <a:r>
               <a:rPr lang="en-SG" altLang="zh-CN" dirty="0"/>
-              <a:t>XYZCommand</a:t>
+              <a:t>XYZCommandParser</a:t>
             </a:r>
             <a:endParaRPr lang="zh-CN" altLang="en-US" dirty="0"/>
           </a:p>
@@ -4509,10 +4711,10 @@
       </p:sp>
       <p:sp>
         <p:nvSpPr>
-          <p:cNvPr id="62" name="TextBox 61">
-            <a:extLst>
-              <a:ext uri="{FF2B5EF4-FFF2-40B4-BE49-F238E27FC236}">
-                <a16:creationId xmlns:a16="http://schemas.microsoft.com/office/drawing/2014/main" id="{4F0B51F9-AA25-443A-9424-21122955F54A}"/>
+          <p:cNvPr id="68" name="TextBox 67">
+            <a:extLst>
+              <a:ext uri="{FF2B5EF4-FFF2-40B4-BE49-F238E27FC236}">
+                <a16:creationId xmlns:a16="http://schemas.microsoft.com/office/drawing/2014/main" id="{F18A034D-BA95-47C0-90F5-C657AB194F55}"/>
               </a:ext>
             </a:extLst>
           </p:cNvPr>
@@ -4521,8 +4723,8 @@
         </p:nvSpPr>
         <p:spPr>
           <a:xfrm>
-            <a:off x="6846426" y="2006041"/>
-            <a:ext cx="1192237" cy="369332"/>
+            <a:off x="3015759" y="1997961"/>
+            <a:ext cx="992082" cy="369332"/>
           </a:xfrm>
           <a:prstGeom prst="rect">
             <a:avLst/>
@@ -4555,295 +4757,6 @@
           </a:p>
         </p:txBody>
       </p:sp>
-      <p:sp>
-        <p:nvSpPr>
-          <p:cNvPr id="63" name="Isosceles Triangle 62">
-            <a:extLst>
-              <a:ext uri="{FF2B5EF4-FFF2-40B4-BE49-F238E27FC236}">
-                <a16:creationId xmlns:a16="http://schemas.microsoft.com/office/drawing/2014/main" id="{0F87F7C4-A86C-4972-9BDB-D2B454FA3EB3}"/>
-              </a:ext>
-            </a:extLst>
-          </p:cNvPr>
-          <p:cNvSpPr/>
-          <p:nvPr/>
-        </p:nvSpPr>
-        <p:spPr>
-          <a:xfrm rot="5400000">
-            <a:off x="7716629" y="2145741"/>
-            <a:ext cx="155565" cy="152371"/>
-          </a:xfrm>
-          <a:prstGeom prst="triangle">
-            <a:avLst/>
-          </a:prstGeom>
-          <a:solidFill>
-            <a:schemeClr val="tx2"/>
-          </a:solidFill>
-        </p:spPr>
-        <p:style>
-          <a:lnRef idx="2">
-            <a:schemeClr val="accent1">
-              <a:shade val="50000"/>
-            </a:schemeClr>
-          </a:lnRef>
-          <a:fillRef idx="1">
-            <a:schemeClr val="accent1"/>
-          </a:fillRef>
-          <a:effectRef idx="0">
-            <a:schemeClr val="accent1"/>
-          </a:effectRef>
-          <a:fontRef idx="minor">
-            <a:schemeClr val="lt1"/>
-          </a:fontRef>
-        </p:style>
-        <p:txBody>
-          <a:bodyPr rtlCol="0" anchor="ctr"/>
-          <a:lstStyle/>
-          <a:p>
-            <a:pPr algn="ctr"/>
-            <a:endParaRPr lang="en-SG"/>
-          </a:p>
-        </p:txBody>
-      </p:sp>
-      <p:sp>
-        <p:nvSpPr>
-          <p:cNvPr id="64" name="Isosceles Triangle 63">
-            <a:extLst>
-              <a:ext uri="{FF2B5EF4-FFF2-40B4-BE49-F238E27FC236}">
-                <a16:creationId xmlns:a16="http://schemas.microsoft.com/office/drawing/2014/main" id="{2DC17196-6EAA-4460-87BE-3F67F7C5031F}"/>
-              </a:ext>
-            </a:extLst>
-          </p:cNvPr>
-          <p:cNvSpPr/>
-          <p:nvPr/>
-        </p:nvSpPr>
-        <p:spPr>
-          <a:xfrm rot="5400000">
-            <a:off x="3964823" y="2125723"/>
-            <a:ext cx="155565" cy="152371"/>
-          </a:xfrm>
-          <a:prstGeom prst="triangle">
-            <a:avLst/>
-          </a:prstGeom>
-          <a:solidFill>
-            <a:schemeClr val="tx2"/>
-          </a:solidFill>
-        </p:spPr>
-        <p:style>
-          <a:lnRef idx="2">
-            <a:schemeClr val="accent1">
-              <a:shade val="50000"/>
-            </a:schemeClr>
-          </a:lnRef>
-          <a:fillRef idx="1">
-            <a:schemeClr val="accent1"/>
-          </a:fillRef>
-          <a:effectRef idx="0">
-            <a:schemeClr val="accent1"/>
-          </a:effectRef>
-          <a:fontRef idx="minor">
-            <a:schemeClr val="lt1"/>
-          </a:fontRef>
-        </p:style>
-        <p:txBody>
-          <a:bodyPr rtlCol="0" anchor="ctr"/>
-          <a:lstStyle/>
-          <a:p>
-            <a:pPr algn="ctr"/>
-            <a:endParaRPr lang="en-SG"/>
-          </a:p>
-        </p:txBody>
-      </p:sp>
-      <p:cxnSp>
-        <p:nvCxnSpPr>
-          <p:cNvPr id="65" name="Straight Arrow Connector 64">
-            <a:extLst>
-              <a:ext uri="{FF2B5EF4-FFF2-40B4-BE49-F238E27FC236}">
-                <a16:creationId xmlns:a16="http://schemas.microsoft.com/office/drawing/2014/main" id="{34EC03B2-1464-40A3-972F-8489A9762E55}"/>
-              </a:ext>
-            </a:extLst>
-          </p:cNvPr>
-          <p:cNvCxnSpPr>
-            <a:cxnSpLocks/>
-            <a:endCxn id="67" idx="2"/>
-          </p:cNvCxnSpPr>
-          <p:nvPr/>
-        </p:nvCxnSpPr>
-        <p:spPr>
-          <a:xfrm flipV="1">
-            <a:off x="2819275" y="2072510"/>
-            <a:ext cx="1834143" cy="3442"/>
-          </a:xfrm>
-          <a:prstGeom prst="straightConnector1">
-            <a:avLst/>
-          </a:prstGeom>
-          <a:ln w="28575">
-            <a:prstDash val="sysDot"/>
-            <a:headEnd type="none" w="med" len="med"/>
-            <a:tailEnd type="arrow" w="med" len="med"/>
-          </a:ln>
-        </p:spPr>
-        <p:style>
-          <a:lnRef idx="1">
-            <a:schemeClr val="accent1"/>
-          </a:lnRef>
-          <a:fillRef idx="0">
-            <a:schemeClr val="accent1"/>
-          </a:fillRef>
-          <a:effectRef idx="0">
-            <a:schemeClr val="accent1"/>
-          </a:effectRef>
-          <a:fontRef idx="minor">
-            <a:schemeClr val="tx1"/>
-          </a:fontRef>
-        </p:style>
-      </p:cxnSp>
-      <p:sp>
-        <p:nvSpPr>
-          <p:cNvPr id="66" name="TextBox 65">
-            <a:extLst>
-              <a:ext uri="{FF2B5EF4-FFF2-40B4-BE49-F238E27FC236}">
-                <a16:creationId xmlns:a16="http://schemas.microsoft.com/office/drawing/2014/main" id="{00B96983-F9F7-418F-BA69-5D3372CF55AB}"/>
-              </a:ext>
-            </a:extLst>
-          </p:cNvPr>
-          <p:cNvSpPr txBox="1"/>
-          <p:nvPr/>
-        </p:nvSpPr>
-        <p:spPr>
-          <a:xfrm rot="5400000">
-            <a:off x="1714513" y="1015504"/>
-            <a:ext cx="461665" cy="2105394"/>
-          </a:xfrm>
-          <a:prstGeom prst="rect">
-            <a:avLst/>
-          </a:prstGeom>
-        </p:spPr>
-        <p:style>
-          <a:lnRef idx="0">
-            <a:schemeClr val="accent1"/>
-          </a:lnRef>
-          <a:fillRef idx="3">
-            <a:schemeClr val="accent1"/>
-          </a:fillRef>
-          <a:effectRef idx="3">
-            <a:schemeClr val="accent1"/>
-          </a:effectRef>
-          <a:fontRef idx="minor">
-            <a:schemeClr val="lt1"/>
-          </a:fontRef>
-        </p:style>
-        <p:txBody>
-          <a:bodyPr vert="vert270" wrap="square" rtlCol="0">
-            <a:spAutoFit/>
-          </a:bodyPr>
-          <a:lstStyle/>
-          <a:p>
-            <a:pPr algn="ctr"/>
-            <a:r>
-              <a:rPr lang="en-SG" altLang="zh-CN" dirty="0"/>
-              <a:t>ParserManager</a:t>
-            </a:r>
-          </a:p>
-        </p:txBody>
-      </p:sp>
-      <p:sp>
-        <p:nvSpPr>
-          <p:cNvPr id="67" name="TextBox 66">
-            <a:extLst>
-              <a:ext uri="{FF2B5EF4-FFF2-40B4-BE49-F238E27FC236}">
-                <a16:creationId xmlns:a16="http://schemas.microsoft.com/office/drawing/2014/main" id="{4DEFB2E9-709C-449B-A7F9-C4A292C49945}"/>
-              </a:ext>
-            </a:extLst>
-          </p:cNvPr>
-          <p:cNvSpPr txBox="1"/>
-          <p:nvPr/>
-        </p:nvSpPr>
-        <p:spPr>
-          <a:xfrm rot="5400000">
-            <a:off x="5533021" y="962073"/>
-            <a:ext cx="461665" cy="2220872"/>
-          </a:xfrm>
-          <a:prstGeom prst="rect">
-            <a:avLst/>
-          </a:prstGeom>
-        </p:spPr>
-        <p:style>
-          <a:lnRef idx="0">
-            <a:schemeClr val="accent1"/>
-          </a:lnRef>
-          <a:fillRef idx="3">
-            <a:schemeClr val="accent1"/>
-          </a:fillRef>
-          <a:effectRef idx="3">
-            <a:schemeClr val="accent1"/>
-          </a:effectRef>
-          <a:fontRef idx="minor">
-            <a:schemeClr val="lt1"/>
-          </a:fontRef>
-        </p:style>
-        <p:txBody>
-          <a:bodyPr vert="vert270" wrap="square" rtlCol="0">
-            <a:spAutoFit/>
-          </a:bodyPr>
-          <a:lstStyle/>
-          <a:p>
-            <a:pPr algn="ctr"/>
-            <a:r>
-              <a:rPr lang="en-SG" altLang="zh-CN" dirty="0"/>
-              <a:t>XYZCommandParser</a:t>
-            </a:r>
-            <a:endParaRPr lang="zh-CN" altLang="en-US" dirty="0"/>
-          </a:p>
-        </p:txBody>
-      </p:sp>
-      <p:sp>
-        <p:nvSpPr>
-          <p:cNvPr id="68" name="TextBox 67">
-            <a:extLst>
-              <a:ext uri="{FF2B5EF4-FFF2-40B4-BE49-F238E27FC236}">
-                <a16:creationId xmlns:a16="http://schemas.microsoft.com/office/drawing/2014/main" id="{F18A034D-BA95-47C0-90F5-C657AB194F55}"/>
-              </a:ext>
-            </a:extLst>
-          </p:cNvPr>
-          <p:cNvSpPr txBox="1"/>
-          <p:nvPr/>
-        </p:nvSpPr>
-        <p:spPr>
-          <a:xfrm>
-            <a:off x="3015759" y="1997960"/>
-            <a:ext cx="992082" cy="369332"/>
-          </a:xfrm>
-          <a:prstGeom prst="rect">
-            <a:avLst/>
-          </a:prstGeom>
-          <a:noFill/>
-        </p:spPr>
-        <p:txBody>
-          <a:bodyPr wrap="square" rtlCol="0">
-            <a:spAutoFit/>
-          </a:bodyPr>
-          <a:lstStyle/>
-          <a:p>
-            <a:r>
-              <a:rPr lang="en-US" altLang="zh-CN" b="1" dirty="0">
-                <a:solidFill>
-                  <a:schemeClr val="accent1">
-                    <a:lumMod val="75000"/>
-                  </a:schemeClr>
-                </a:solidFill>
-              </a:rPr>
-              <a:t>creates</a:t>
-            </a:r>
-            <a:endParaRPr lang="zh-CN" altLang="en-US" b="1" dirty="0">
-              <a:solidFill>
-                <a:schemeClr val="accent1">
-                  <a:lumMod val="75000"/>
-                </a:schemeClr>
-              </a:solidFill>
-            </a:endParaRPr>
-          </a:p>
-        </p:txBody>
-      </p:sp>
       <p:cxnSp>
         <p:nvCxnSpPr>
           <p:cNvPr id="87" name="Straight Arrow Connector 86">
@@ -4860,7 +4773,7 @@
         </p:nvCxnSpPr>
         <p:spPr>
           <a:xfrm flipV="1">
-            <a:off x="2819275" y="3755879"/>
+            <a:off x="2819275" y="3755882"/>
             <a:ext cx="0" cy="398837"/>
           </a:xfrm>
           <a:prstGeom prst="straightConnector1">
@@ -4903,7 +4816,7 @@
         </p:nvCxnSpPr>
         <p:spPr>
           <a:xfrm flipV="1">
-            <a:off x="2815371" y="4144122"/>
+            <a:off x="2815371" y="4144125"/>
             <a:ext cx="1474478" cy="673"/>
           </a:xfrm>
           <a:prstGeom prst="line">
@@ -4942,7 +4855,7 @@
         </p:nvSpPr>
         <p:spPr>
           <a:xfrm>
-            <a:off x="537409" y="5830541"/>
+            <a:off x="537409" y="5830544"/>
             <a:ext cx="11213432" cy="770929"/>
           </a:xfrm>
           <a:prstGeom prst="roundRect">
@@ -4994,10 +4907,10 @@
       </p:sp>
       <p:cxnSp>
         <p:nvCxnSpPr>
-          <p:cNvPr id="100" name="Straight Arrow Connector 99">
-            <a:extLst>
-              <a:ext uri="{FF2B5EF4-FFF2-40B4-BE49-F238E27FC236}">
-                <a16:creationId xmlns:a16="http://schemas.microsoft.com/office/drawing/2014/main" id="{EC9B511F-7489-4C45-A95B-E319A8801A2D}"/>
+          <p:cNvPr id="42" name="Straight Connector 41">
+            <a:extLst>
+              <a:ext uri="{FF2B5EF4-FFF2-40B4-BE49-F238E27FC236}">
+                <a16:creationId xmlns:a16="http://schemas.microsoft.com/office/drawing/2014/main" id="{6235289D-EF27-4D75-9E38-DCEB6E7547C4}"/>
               </a:ext>
             </a:extLst>
           </p:cNvPr>
@@ -5007,9 +4920,50 @@
           <p:nvPr/>
         </p:nvCxnSpPr>
         <p:spPr>
-          <a:xfrm flipH="1">
-            <a:off x="1785326" y="3732376"/>
-            <a:ext cx="24224" cy="2098165"/>
+          <a:xfrm flipH="1" flipV="1">
+            <a:off x="9689270" y="2109342"/>
+            <a:ext cx="385845" cy="3"/>
+          </a:xfrm>
+          <a:prstGeom prst="line">
+            <a:avLst/>
+          </a:prstGeom>
+          <a:ln w="28575">
+            <a:prstDash val="solid"/>
+          </a:ln>
+        </p:spPr>
+        <p:style>
+          <a:lnRef idx="1">
+            <a:schemeClr val="accent1"/>
+          </a:lnRef>
+          <a:fillRef idx="0">
+            <a:schemeClr val="accent1"/>
+          </a:fillRef>
+          <a:effectRef idx="0">
+            <a:schemeClr val="accent1"/>
+          </a:effectRef>
+          <a:fontRef idx="minor">
+            <a:schemeClr val="tx1"/>
+          </a:fontRef>
+        </p:style>
+      </p:cxnSp>
+      <p:cxnSp>
+        <p:nvCxnSpPr>
+          <p:cNvPr id="100" name="Straight Arrow Connector 99">
+            <a:extLst>
+              <a:ext uri="{FF2B5EF4-FFF2-40B4-BE49-F238E27FC236}">
+                <a16:creationId xmlns:a16="http://schemas.microsoft.com/office/drawing/2014/main" id="{EC9B511F-7489-4C45-A95B-E319A8801A2D}"/>
+              </a:ext>
+            </a:extLst>
+          </p:cNvPr>
+          <p:cNvCxnSpPr>
+            <a:cxnSpLocks/>
+          </p:cNvCxnSpPr>
+          <p:nvPr/>
+        </p:nvCxnSpPr>
+        <p:spPr>
+          <a:xfrm>
+            <a:off x="1809550" y="3732379"/>
+            <a:ext cx="0" cy="2098165"/>
           </a:xfrm>
           <a:prstGeom prst="straightConnector1">
             <a:avLst/>
@@ -5048,7 +5002,7 @@
         </p:nvSpPr>
         <p:spPr>
           <a:xfrm>
-            <a:off x="6583679" y="305405"/>
+            <a:off x="6583679" y="305407"/>
             <a:ext cx="2002034" cy="1258441"/>
           </a:xfrm>
           <a:prstGeom prst="foldedCorner">
@@ -5087,52 +5041,12 @@
           <a:p>
             <a:pPr algn="ctr"/>
             <a:r>
-              <a:rPr lang="en-US" dirty="0" err="1">
-                <a:solidFill>
-                  <a:schemeClr val="tx1"/>
-                </a:solidFill>
-              </a:rPr>
-              <a:t>XYZCommand</a:t>
-            </a:r>
-            <a:r>
               <a:rPr lang="en-US" dirty="0">
                 <a:solidFill>
                   <a:schemeClr val="tx1"/>
                 </a:solidFill>
               </a:rPr>
-              <a:t> = </a:t>
-            </a:r>
-            <a:r>
-              <a:rPr lang="en-US" dirty="0" err="1">
-                <a:solidFill>
-                  <a:schemeClr val="tx1"/>
-                </a:solidFill>
-              </a:rPr>
-              <a:t>DoneCommand</a:t>
-            </a:r>
-            <a:r>
-              <a:rPr lang="en-US" dirty="0">
-                <a:solidFill>
-                  <a:schemeClr val="tx1"/>
-                </a:solidFill>
-              </a:rPr>
-              <a:t>, </a:t>
-            </a:r>
-            <a:r>
-              <a:rPr lang="en-US" dirty="0" err="1">
-                <a:solidFill>
-                  <a:schemeClr val="tx1"/>
-                </a:solidFill>
-              </a:rPr>
-              <a:t>DeleteCommand</a:t>
-            </a:r>
-            <a:r>
-              <a:rPr lang="en-US" dirty="0">
-                <a:solidFill>
-                  <a:schemeClr val="tx1"/>
-                </a:solidFill>
-              </a:rPr>
-              <a:t>, etc.</a:t>
+              <a:t>XYZCommand = DoneCommand, DeleteCommand, etc.</a:t>
             </a:r>
           </a:p>
         </p:txBody>
@@ -5151,7 +5065,7 @@
         </p:nvSpPr>
         <p:spPr>
           <a:xfrm>
-            <a:off x="8796737" y="282777"/>
+            <a:off x="8796737" y="282779"/>
             <a:ext cx="2507433" cy="1322489"/>
           </a:xfrm>
           <a:prstGeom prst="foldedCorner">
@@ -5190,56 +5104,168 @@
           <a:p>
             <a:pPr algn="ctr"/>
             <a:r>
-              <a:rPr lang="en-US" dirty="0" err="1">
-                <a:solidFill>
-                  <a:schemeClr val="tx1"/>
-                </a:solidFill>
-              </a:rPr>
-              <a:t>XYZCommandParser</a:t>
-            </a:r>
-            <a:r>
               <a:rPr lang="en-US" dirty="0">
                 <a:solidFill>
                   <a:schemeClr val="tx1"/>
                 </a:solidFill>
               </a:rPr>
-              <a:t> = </a:t>
-            </a:r>
-            <a:r>
-              <a:rPr lang="en-US" dirty="0" err="1">
-                <a:solidFill>
-                  <a:schemeClr val="tx1"/>
-                </a:solidFill>
-              </a:rPr>
-              <a:t>DoneCommandParser</a:t>
-            </a:r>
-            <a:r>
-              <a:rPr lang="en-US" dirty="0">
-                <a:solidFill>
-                  <a:schemeClr val="tx1"/>
-                </a:solidFill>
-              </a:rPr>
-              <a:t>, </a:t>
-            </a:r>
-            <a:r>
-              <a:rPr lang="en-US" dirty="0" err="1">
-                <a:solidFill>
-                  <a:schemeClr val="tx1"/>
-                </a:solidFill>
-              </a:rPr>
-              <a:t>DeleteCommandParser</a:t>
-            </a:r>
-            <a:r>
-              <a:rPr lang="en-US" dirty="0">
-                <a:solidFill>
-                  <a:schemeClr val="tx1"/>
-                </a:solidFill>
-              </a:rPr>
-              <a:t>, etc.</a:t>
-            </a:r>
-          </a:p>
-        </p:txBody>
-      </p:sp>
+              <a:t>XYZCommandParser = DoneCommandParser, DeleteCommandParser, etc.</a:t>
+            </a:r>
+          </a:p>
+        </p:txBody>
+      </p:sp>
+      <p:sp>
+        <p:nvSpPr>
+          <p:cNvPr id="41" name="TextBox 40">
+            <a:extLst>
+              <a:ext uri="{FF2B5EF4-FFF2-40B4-BE49-F238E27FC236}">
+                <a16:creationId xmlns:a16="http://schemas.microsoft.com/office/drawing/2014/main" id="{DEBE1FEC-A12E-4D3F-95E0-6D89FC01F0FF}"/>
+              </a:ext>
+            </a:extLst>
+          </p:cNvPr>
+          <p:cNvSpPr txBox="1"/>
+          <p:nvPr/>
+        </p:nvSpPr>
+        <p:spPr>
+          <a:xfrm rot="5400000">
+            <a:off x="10607219" y="1390216"/>
+            <a:ext cx="738664" cy="1445569"/>
+          </a:xfrm>
+          <a:prstGeom prst="rect">
+            <a:avLst/>
+          </a:prstGeom>
+        </p:spPr>
+        <p:style>
+          <a:lnRef idx="0">
+            <a:schemeClr val="accent1"/>
+          </a:lnRef>
+          <a:fillRef idx="3">
+            <a:schemeClr val="accent1"/>
+          </a:fillRef>
+          <a:effectRef idx="3">
+            <a:schemeClr val="accent1"/>
+          </a:effectRef>
+          <a:fontRef idx="minor">
+            <a:schemeClr val="lt1"/>
+          </a:fontRef>
+        </p:style>
+        <p:txBody>
+          <a:bodyPr vert="vert270" wrap="square" rtlCol="0">
+            <a:spAutoFit/>
+          </a:bodyPr>
+          <a:lstStyle/>
+          <a:p>
+            <a:pPr algn="ctr"/>
+            <a:r>
+              <a:rPr lang="en-SG" altLang="zh-CN" dirty="0"/>
+              <a:t>{abstract}</a:t>
+            </a:r>
+          </a:p>
+          <a:p>
+            <a:pPr algn="ctr"/>
+            <a:r>
+              <a:rPr lang="en-SG" altLang="zh-CN" dirty="0"/>
+              <a:t>Command</a:t>
+            </a:r>
+            <a:endParaRPr lang="zh-CN" altLang="en-US" dirty="0"/>
+          </a:p>
+        </p:txBody>
+      </p:sp>
+      <p:sp>
+        <p:nvSpPr>
+          <p:cNvPr id="70" name="Isosceles Triangle 69">
+            <a:extLst>
+              <a:ext uri="{FF2B5EF4-FFF2-40B4-BE49-F238E27FC236}">
+                <a16:creationId xmlns:a16="http://schemas.microsoft.com/office/drawing/2014/main" id="{450CE672-17A0-46F3-9F77-878C0769CA06}"/>
+              </a:ext>
+            </a:extLst>
+          </p:cNvPr>
+          <p:cNvSpPr/>
+          <p:nvPr/>
+        </p:nvSpPr>
+        <p:spPr>
+          <a:xfrm rot="5400000">
+            <a:off x="9934820" y="1974586"/>
+            <a:ext cx="365757" cy="269508"/>
+          </a:xfrm>
+          <a:prstGeom prst="triangle">
+            <a:avLst/>
+          </a:prstGeom>
+          <a:solidFill>
+            <a:schemeClr val="accent1">
+              <a:lumMod val="60000"/>
+              <a:lumOff val="40000"/>
+            </a:schemeClr>
+          </a:solidFill>
+        </p:spPr>
+        <p:style>
+          <a:lnRef idx="2">
+            <a:schemeClr val="accent1">
+              <a:shade val="50000"/>
+            </a:schemeClr>
+          </a:lnRef>
+          <a:fillRef idx="1">
+            <a:schemeClr val="accent1"/>
+          </a:fillRef>
+          <a:effectRef idx="0">
+            <a:schemeClr val="accent1"/>
+          </a:effectRef>
+          <a:fontRef idx="minor">
+            <a:schemeClr val="lt1"/>
+          </a:fontRef>
+        </p:style>
+        <p:txBody>
+          <a:bodyPr rtlCol="0" anchor="ctr"/>
+          <a:lstStyle/>
+          <a:p>
+            <a:pPr algn="ctr"/>
+            <a:endParaRPr lang="en-SG"/>
+          </a:p>
+        </p:txBody>
+      </p:sp>
+      <p:cxnSp>
+        <p:nvCxnSpPr>
+          <p:cNvPr id="88" name="Straight Arrow Connector 87">
+            <a:extLst>
+              <a:ext uri="{FF2B5EF4-FFF2-40B4-BE49-F238E27FC236}">
+                <a16:creationId xmlns:a16="http://schemas.microsoft.com/office/drawing/2014/main" id="{E09470E3-96EF-423B-A62B-1FA57932497E}"/>
+              </a:ext>
+            </a:extLst>
+          </p:cNvPr>
+          <p:cNvCxnSpPr>
+            <a:cxnSpLocks/>
+          </p:cNvCxnSpPr>
+          <p:nvPr/>
+        </p:nvCxnSpPr>
+        <p:spPr>
+          <a:xfrm flipV="1">
+            <a:off x="-942152" y="2072510"/>
+            <a:ext cx="1834143" cy="3444"/>
+          </a:xfrm>
+          <a:prstGeom prst="straightConnector1">
+            <a:avLst/>
+          </a:prstGeom>
+          <a:ln w="28575">
+            <a:prstDash val="sysDot"/>
+            <a:headEnd type="none" w="med" len="med"/>
+            <a:tailEnd type="arrow" w="med" len="med"/>
+          </a:ln>
+        </p:spPr>
+        <p:style>
+          <a:lnRef idx="1">
+            <a:schemeClr val="accent1"/>
+          </a:lnRef>
+          <a:fillRef idx="0">
+            <a:schemeClr val="accent1"/>
+          </a:fillRef>
+          <a:effectRef idx="0">
+            <a:schemeClr val="accent1"/>
+          </a:effectRef>
+          <a:fontRef idx="minor">
+            <a:schemeClr val="tx1"/>
+          </a:fontRef>
+        </p:style>
+      </p:cxnSp>
     </p:spTree>
     <p:extLst>
       <p:ext uri="{BB962C8B-B14F-4D97-AF65-F5344CB8AC3E}">

</xml_diff>